<commit_message>
Changed main page logo
</commit_message>
<xml_diff>
--- a/common/img/Logo.pptx
+++ b/common/img/Logo.pptx
@@ -264,7 +264,7 @@
           <a:p>
             <a:fld id="{4967892D-CE2D-495A-A9CA-7CB88C831AAA}" type="datetimeFigureOut">
               <a:rPr lang="en-IN" smtClean="0"/>
-              <a:t>03-12-2021</a:t>
+              <a:t>21-12-2022</a:t>
             </a:fld>
             <a:endParaRPr lang="en-IN"/>
           </a:p>
@@ -464,7 +464,7 @@
           <a:p>
             <a:fld id="{4967892D-CE2D-495A-A9CA-7CB88C831AAA}" type="datetimeFigureOut">
               <a:rPr lang="en-IN" smtClean="0"/>
-              <a:t>03-12-2021</a:t>
+              <a:t>21-12-2022</a:t>
             </a:fld>
             <a:endParaRPr lang="en-IN"/>
           </a:p>
@@ -674,7 +674,7 @@
           <a:p>
             <a:fld id="{4967892D-CE2D-495A-A9CA-7CB88C831AAA}" type="datetimeFigureOut">
               <a:rPr lang="en-IN" smtClean="0"/>
-              <a:t>03-12-2021</a:t>
+              <a:t>21-12-2022</a:t>
             </a:fld>
             <a:endParaRPr lang="en-IN"/>
           </a:p>
@@ -874,7 +874,7 @@
           <a:p>
             <a:fld id="{4967892D-CE2D-495A-A9CA-7CB88C831AAA}" type="datetimeFigureOut">
               <a:rPr lang="en-IN" smtClean="0"/>
-              <a:t>03-12-2021</a:t>
+              <a:t>21-12-2022</a:t>
             </a:fld>
             <a:endParaRPr lang="en-IN"/>
           </a:p>
@@ -1150,7 +1150,7 @@
           <a:p>
             <a:fld id="{4967892D-CE2D-495A-A9CA-7CB88C831AAA}" type="datetimeFigureOut">
               <a:rPr lang="en-IN" smtClean="0"/>
-              <a:t>03-12-2021</a:t>
+              <a:t>21-12-2022</a:t>
             </a:fld>
             <a:endParaRPr lang="en-IN"/>
           </a:p>
@@ -1418,7 +1418,7 @@
           <a:p>
             <a:fld id="{4967892D-CE2D-495A-A9CA-7CB88C831AAA}" type="datetimeFigureOut">
               <a:rPr lang="en-IN" smtClean="0"/>
-              <a:t>03-12-2021</a:t>
+              <a:t>21-12-2022</a:t>
             </a:fld>
             <a:endParaRPr lang="en-IN"/>
           </a:p>
@@ -1833,7 +1833,7 @@
           <a:p>
             <a:fld id="{4967892D-CE2D-495A-A9CA-7CB88C831AAA}" type="datetimeFigureOut">
               <a:rPr lang="en-IN" smtClean="0"/>
-              <a:t>03-12-2021</a:t>
+              <a:t>21-12-2022</a:t>
             </a:fld>
             <a:endParaRPr lang="en-IN"/>
           </a:p>
@@ -1975,7 +1975,7 @@
           <a:p>
             <a:fld id="{4967892D-CE2D-495A-A9CA-7CB88C831AAA}" type="datetimeFigureOut">
               <a:rPr lang="en-IN" smtClean="0"/>
-              <a:t>03-12-2021</a:t>
+              <a:t>21-12-2022</a:t>
             </a:fld>
             <a:endParaRPr lang="en-IN"/>
           </a:p>
@@ -2088,7 +2088,7 @@
           <a:p>
             <a:fld id="{4967892D-CE2D-495A-A9CA-7CB88C831AAA}" type="datetimeFigureOut">
               <a:rPr lang="en-IN" smtClean="0"/>
-              <a:t>03-12-2021</a:t>
+              <a:t>21-12-2022</a:t>
             </a:fld>
             <a:endParaRPr lang="en-IN"/>
           </a:p>
@@ -2401,7 +2401,7 @@
           <a:p>
             <a:fld id="{4967892D-CE2D-495A-A9CA-7CB88C831AAA}" type="datetimeFigureOut">
               <a:rPr lang="en-IN" smtClean="0"/>
-              <a:t>03-12-2021</a:t>
+              <a:t>21-12-2022</a:t>
             </a:fld>
             <a:endParaRPr lang="en-IN"/>
           </a:p>
@@ -2690,7 +2690,7 @@
           <a:p>
             <a:fld id="{4967892D-CE2D-495A-A9CA-7CB88C831AAA}" type="datetimeFigureOut">
               <a:rPr lang="en-IN" smtClean="0"/>
-              <a:t>03-12-2021</a:t>
+              <a:t>21-12-2022</a:t>
             </a:fld>
             <a:endParaRPr lang="en-IN"/>
           </a:p>
@@ -2933,7 +2933,7 @@
           <a:p>
             <a:fld id="{4967892D-CE2D-495A-A9CA-7CB88C831AAA}" type="datetimeFigureOut">
               <a:rPr lang="en-IN" smtClean="0"/>
-              <a:t>03-12-2021</a:t>
+              <a:t>21-12-2022</a:t>
             </a:fld>
             <a:endParaRPr lang="en-IN"/>
           </a:p>
@@ -4347,15 +4347,8 @@
                 <a:latin typeface="Arial" panose="020B0604020202020204" pitchFamily="34" charset="0"/>
                 <a:cs typeface="Arial" panose="020B0604020202020204" pitchFamily="34" charset="0"/>
               </a:rPr>
-              <a:t>WEB APPS </a:t>
-            </a:r>
-            <a:endParaRPr lang="en-US" sz="2800" b="1" i="1" dirty="0">
-              <a:solidFill>
-                <a:schemeClr val="bg1"/>
-              </a:solidFill>
-              <a:latin typeface="Arial" panose="020B0604020202020204" pitchFamily="34" charset="0"/>
-              <a:cs typeface="Arial" panose="020B0604020202020204" pitchFamily="34" charset="0"/>
-            </a:endParaRPr>
+              <a:t>RESPIMATIC 100</a:t>
+            </a:r>
           </a:p>
           <a:p>
             <a:pPr algn="ctr"/>
@@ -4367,7 +4360,7 @@
                 <a:latin typeface="Arial" panose="020B0604020202020204" pitchFamily="34" charset="0"/>
                 <a:cs typeface="Arial" panose="020B0604020202020204" pitchFamily="34" charset="0"/>
               </a:rPr>
-              <a:t>RESPIMATIC 100 </a:t>
+              <a:t>WEB APPS </a:t>
             </a:r>
             <a:endParaRPr lang="en-IN" sz="2800" b="1" dirty="0">
               <a:solidFill>
@@ -4575,6 +4568,19 @@
                 <a:latin typeface="Arial" panose="020B0604020202020204" pitchFamily="34" charset="0"/>
                 <a:cs typeface="Arial" panose="020B0604020202020204" pitchFamily="34" charset="0"/>
               </a:rPr>
+              <a:t>RESPIMATIC 100</a:t>
+            </a:r>
+          </a:p>
+          <a:p>
+            <a:pPr algn="ctr"/>
+            <a:r>
+              <a:rPr lang="en-US" sz="2800" b="1" dirty="0">
+                <a:solidFill>
+                  <a:schemeClr val="bg1"/>
+                </a:solidFill>
+                <a:latin typeface="Arial" panose="020B0604020202020204" pitchFamily="34" charset="0"/>
+                <a:cs typeface="Arial" panose="020B0604020202020204" pitchFamily="34" charset="0"/>
+              </a:rPr>
               <a:t>O</a:t>
             </a:r>
             <a:r>
@@ -4595,27 +4601,7 @@
                 <a:latin typeface="Arial" panose="020B0604020202020204" pitchFamily="34" charset="0"/>
                 <a:cs typeface="Arial" panose="020B0604020202020204" pitchFamily="34" charset="0"/>
               </a:rPr>
-              <a:t> Flow Rate Calculator</a:t>
-            </a:r>
-            <a:endParaRPr lang="en-US" sz="2800" b="1" i="1" dirty="0">
-              <a:solidFill>
-                <a:schemeClr val="bg1"/>
-              </a:solidFill>
-              <a:latin typeface="Arial" panose="020B0604020202020204" pitchFamily="34" charset="0"/>
-              <a:cs typeface="Arial" panose="020B0604020202020204" pitchFamily="34" charset="0"/>
-            </a:endParaRPr>
-          </a:p>
-          <a:p>
-            <a:pPr algn="ctr"/>
-            <a:r>
-              <a:rPr lang="en-US" sz="2800" b="1" dirty="0">
-                <a:solidFill>
-                  <a:schemeClr val="bg1"/>
-                </a:solidFill>
-                <a:latin typeface="Arial" panose="020B0604020202020204" pitchFamily="34" charset="0"/>
-                <a:cs typeface="Arial" panose="020B0604020202020204" pitchFamily="34" charset="0"/>
-              </a:rPr>
-              <a:t>RESPIMATIC 100 </a:t>
+              <a:t> Flow Rate Calculator </a:t>
             </a:r>
             <a:endParaRPr lang="en-IN" sz="2800" b="1" dirty="0">
               <a:solidFill>

</xml_diff>

<commit_message>
Got rid of big buttons on the main menu
</commit_message>
<xml_diff>
--- a/common/img/Logo.pptx
+++ b/common/img/Logo.pptx
@@ -4324,12 +4324,10 @@
             <a:avLst/>
           </a:prstGeom>
           <a:solidFill>
-            <a:srgbClr val="1D85AD"/>
+            <a:srgbClr val="0D3E51"/>
           </a:solidFill>
           <a:ln w="12700">
-            <a:solidFill>
-              <a:schemeClr val="bg1"/>
-            </a:solidFill>
+            <a:noFill/>
           </a:ln>
         </p:spPr>
         <p:txBody>

</xml_diff>

<commit_message>
White border on logo
</commit_message>
<xml_diff>
--- a/common/img/Logo.pptx
+++ b/common/img/Logo.pptx
@@ -264,7 +264,7 @@
           <a:p>
             <a:fld id="{4967892D-CE2D-495A-A9CA-7CB88C831AAA}" type="datetimeFigureOut">
               <a:rPr lang="en-IN" smtClean="0"/>
-              <a:t>21-12-2022</a:t>
+              <a:t>23-12-2022</a:t>
             </a:fld>
             <a:endParaRPr lang="en-IN"/>
           </a:p>
@@ -464,7 +464,7 @@
           <a:p>
             <a:fld id="{4967892D-CE2D-495A-A9CA-7CB88C831AAA}" type="datetimeFigureOut">
               <a:rPr lang="en-IN" smtClean="0"/>
-              <a:t>21-12-2022</a:t>
+              <a:t>23-12-2022</a:t>
             </a:fld>
             <a:endParaRPr lang="en-IN"/>
           </a:p>
@@ -674,7 +674,7 @@
           <a:p>
             <a:fld id="{4967892D-CE2D-495A-A9CA-7CB88C831AAA}" type="datetimeFigureOut">
               <a:rPr lang="en-IN" smtClean="0"/>
-              <a:t>21-12-2022</a:t>
+              <a:t>23-12-2022</a:t>
             </a:fld>
             <a:endParaRPr lang="en-IN"/>
           </a:p>
@@ -874,7 +874,7 @@
           <a:p>
             <a:fld id="{4967892D-CE2D-495A-A9CA-7CB88C831AAA}" type="datetimeFigureOut">
               <a:rPr lang="en-IN" smtClean="0"/>
-              <a:t>21-12-2022</a:t>
+              <a:t>23-12-2022</a:t>
             </a:fld>
             <a:endParaRPr lang="en-IN"/>
           </a:p>
@@ -1150,7 +1150,7 @@
           <a:p>
             <a:fld id="{4967892D-CE2D-495A-A9CA-7CB88C831AAA}" type="datetimeFigureOut">
               <a:rPr lang="en-IN" smtClean="0"/>
-              <a:t>21-12-2022</a:t>
+              <a:t>23-12-2022</a:t>
             </a:fld>
             <a:endParaRPr lang="en-IN"/>
           </a:p>
@@ -1418,7 +1418,7 @@
           <a:p>
             <a:fld id="{4967892D-CE2D-495A-A9CA-7CB88C831AAA}" type="datetimeFigureOut">
               <a:rPr lang="en-IN" smtClean="0"/>
-              <a:t>21-12-2022</a:t>
+              <a:t>23-12-2022</a:t>
             </a:fld>
             <a:endParaRPr lang="en-IN"/>
           </a:p>
@@ -1833,7 +1833,7 @@
           <a:p>
             <a:fld id="{4967892D-CE2D-495A-A9CA-7CB88C831AAA}" type="datetimeFigureOut">
               <a:rPr lang="en-IN" smtClean="0"/>
-              <a:t>21-12-2022</a:t>
+              <a:t>23-12-2022</a:t>
             </a:fld>
             <a:endParaRPr lang="en-IN"/>
           </a:p>
@@ -1975,7 +1975,7 @@
           <a:p>
             <a:fld id="{4967892D-CE2D-495A-A9CA-7CB88C831AAA}" type="datetimeFigureOut">
               <a:rPr lang="en-IN" smtClean="0"/>
-              <a:t>21-12-2022</a:t>
+              <a:t>23-12-2022</a:t>
             </a:fld>
             <a:endParaRPr lang="en-IN"/>
           </a:p>
@@ -2088,7 +2088,7 @@
           <a:p>
             <a:fld id="{4967892D-CE2D-495A-A9CA-7CB88C831AAA}" type="datetimeFigureOut">
               <a:rPr lang="en-IN" smtClean="0"/>
-              <a:t>21-12-2022</a:t>
+              <a:t>23-12-2022</a:t>
             </a:fld>
             <a:endParaRPr lang="en-IN"/>
           </a:p>
@@ -2401,7 +2401,7 @@
           <a:p>
             <a:fld id="{4967892D-CE2D-495A-A9CA-7CB88C831AAA}" type="datetimeFigureOut">
               <a:rPr lang="en-IN" smtClean="0"/>
-              <a:t>21-12-2022</a:t>
+              <a:t>23-12-2022</a:t>
             </a:fld>
             <a:endParaRPr lang="en-IN"/>
           </a:p>
@@ -2690,7 +2690,7 @@
           <a:p>
             <a:fld id="{4967892D-CE2D-495A-A9CA-7CB88C831AAA}" type="datetimeFigureOut">
               <a:rPr lang="en-IN" smtClean="0"/>
-              <a:t>21-12-2022</a:t>
+              <a:t>23-12-2022</a:t>
             </a:fld>
             <a:endParaRPr lang="en-IN"/>
           </a:p>
@@ -2933,7 +2933,7 @@
           <a:p>
             <a:fld id="{4967892D-CE2D-495A-A9CA-7CB88C831AAA}" type="datetimeFigureOut">
               <a:rPr lang="en-IN" smtClean="0"/>
-              <a:t>21-12-2022</a:t>
+              <a:t>23-12-2022</a:t>
             </a:fld>
             <a:endParaRPr lang="en-IN"/>
           </a:p>
@@ -4317,7 +4317,7 @@
         </p:nvSpPr>
         <p:spPr>
           <a:xfrm>
-            <a:off x="260552" y="291461"/>
+            <a:off x="260552" y="238195"/>
             <a:ext cx="4316360" cy="954107"/>
           </a:xfrm>
           <a:prstGeom prst="rect">
@@ -4326,8 +4326,10 @@
           <a:solidFill>
             <a:srgbClr val="1D85AD"/>
           </a:solidFill>
-          <a:ln w="12700">
-            <a:noFill/>
+          <a:ln w="28575">
+            <a:solidFill>
+              <a:schemeClr val="bg1"/>
+            </a:solidFill>
           </a:ln>
         </p:spPr>
         <p:txBody>

</xml_diff>

<commit_message>
Take out the PSV calc from main menu
</commit_message>
<xml_diff>
--- a/common/img/Logo.pptx
+++ b/common/img/Logo.pptx
@@ -264,7 +264,7 @@
           <a:p>
             <a:fld id="{4967892D-CE2D-495A-A9CA-7CB88C831AAA}" type="datetimeFigureOut">
               <a:rPr lang="en-IN" smtClean="0"/>
-              <a:t>01-01-2023</a:t>
+              <a:t>06-04-2023</a:t>
             </a:fld>
             <a:endParaRPr lang="en-IN"/>
           </a:p>
@@ -464,7 +464,7 @@
           <a:p>
             <a:fld id="{4967892D-CE2D-495A-A9CA-7CB88C831AAA}" type="datetimeFigureOut">
               <a:rPr lang="en-IN" smtClean="0"/>
-              <a:t>01-01-2023</a:t>
+              <a:t>06-04-2023</a:t>
             </a:fld>
             <a:endParaRPr lang="en-IN"/>
           </a:p>
@@ -674,7 +674,7 @@
           <a:p>
             <a:fld id="{4967892D-CE2D-495A-A9CA-7CB88C831AAA}" type="datetimeFigureOut">
               <a:rPr lang="en-IN" smtClean="0"/>
-              <a:t>01-01-2023</a:t>
+              <a:t>06-04-2023</a:t>
             </a:fld>
             <a:endParaRPr lang="en-IN"/>
           </a:p>
@@ -874,7 +874,7 @@
           <a:p>
             <a:fld id="{4967892D-CE2D-495A-A9CA-7CB88C831AAA}" type="datetimeFigureOut">
               <a:rPr lang="en-IN" smtClean="0"/>
-              <a:t>01-01-2023</a:t>
+              <a:t>06-04-2023</a:t>
             </a:fld>
             <a:endParaRPr lang="en-IN"/>
           </a:p>
@@ -1150,7 +1150,7 @@
           <a:p>
             <a:fld id="{4967892D-CE2D-495A-A9CA-7CB88C831AAA}" type="datetimeFigureOut">
               <a:rPr lang="en-IN" smtClean="0"/>
-              <a:t>01-01-2023</a:t>
+              <a:t>06-04-2023</a:t>
             </a:fld>
             <a:endParaRPr lang="en-IN"/>
           </a:p>
@@ -1418,7 +1418,7 @@
           <a:p>
             <a:fld id="{4967892D-CE2D-495A-A9CA-7CB88C831AAA}" type="datetimeFigureOut">
               <a:rPr lang="en-IN" smtClean="0"/>
-              <a:t>01-01-2023</a:t>
+              <a:t>06-04-2023</a:t>
             </a:fld>
             <a:endParaRPr lang="en-IN"/>
           </a:p>
@@ -1833,7 +1833,7 @@
           <a:p>
             <a:fld id="{4967892D-CE2D-495A-A9CA-7CB88C831AAA}" type="datetimeFigureOut">
               <a:rPr lang="en-IN" smtClean="0"/>
-              <a:t>01-01-2023</a:t>
+              <a:t>06-04-2023</a:t>
             </a:fld>
             <a:endParaRPr lang="en-IN"/>
           </a:p>
@@ -1975,7 +1975,7 @@
           <a:p>
             <a:fld id="{4967892D-CE2D-495A-A9CA-7CB88C831AAA}" type="datetimeFigureOut">
               <a:rPr lang="en-IN" smtClean="0"/>
-              <a:t>01-01-2023</a:t>
+              <a:t>06-04-2023</a:t>
             </a:fld>
             <a:endParaRPr lang="en-IN"/>
           </a:p>
@@ -2088,7 +2088,7 @@
           <a:p>
             <a:fld id="{4967892D-CE2D-495A-A9CA-7CB88C831AAA}" type="datetimeFigureOut">
               <a:rPr lang="en-IN" smtClean="0"/>
-              <a:t>01-01-2023</a:t>
+              <a:t>06-04-2023</a:t>
             </a:fld>
             <a:endParaRPr lang="en-IN"/>
           </a:p>
@@ -2401,7 +2401,7 @@
           <a:p>
             <a:fld id="{4967892D-CE2D-495A-A9CA-7CB88C831AAA}" type="datetimeFigureOut">
               <a:rPr lang="en-IN" smtClean="0"/>
-              <a:t>01-01-2023</a:t>
+              <a:t>06-04-2023</a:t>
             </a:fld>
             <a:endParaRPr lang="en-IN"/>
           </a:p>
@@ -2690,7 +2690,7 @@
           <a:p>
             <a:fld id="{4967892D-CE2D-495A-A9CA-7CB88C831AAA}" type="datetimeFigureOut">
               <a:rPr lang="en-IN" smtClean="0"/>
-              <a:t>01-01-2023</a:t>
+              <a:t>06-04-2023</a:t>
             </a:fld>
             <a:endParaRPr lang="en-IN"/>
           </a:p>
@@ -2933,7 +2933,7 @@
           <a:p>
             <a:fld id="{4967892D-CE2D-495A-A9CA-7CB88C831AAA}" type="datetimeFigureOut">
               <a:rPr lang="en-IN" smtClean="0"/>
-              <a:t>01-01-2023</a:t>
+              <a:t>06-04-2023</a:t>
             </a:fld>
             <a:endParaRPr lang="en-IN"/>
           </a:p>
@@ -4711,6 +4711,75 @@
           </a:prstGeom>
         </p:spPr>
       </p:pic>
+      <p:sp>
+        <p:nvSpPr>
+          <p:cNvPr id="8" name="TextBox 7">
+            <a:extLst>
+              <a:ext uri="{FF2B5EF4-FFF2-40B4-BE49-F238E27FC236}">
+                <a16:creationId xmlns:a16="http://schemas.microsoft.com/office/drawing/2014/main" id="{7C5F11AA-3E06-6C64-CBC5-8A6CCE175CD8}"/>
+              </a:ext>
+            </a:extLst>
+          </p:cNvPr>
+          <p:cNvSpPr txBox="1"/>
+          <p:nvPr/>
+        </p:nvSpPr>
+        <p:spPr>
+          <a:xfrm>
+            <a:off x="5801698" y="1799996"/>
+            <a:ext cx="4316360" cy="954107"/>
+          </a:xfrm>
+          <a:prstGeom prst="rect">
+            <a:avLst/>
+          </a:prstGeom>
+          <a:solidFill>
+            <a:srgbClr val="1D85AD"/>
+          </a:solidFill>
+          <a:ln w="12700">
+            <a:solidFill>
+              <a:schemeClr val="bg1"/>
+            </a:solidFill>
+          </a:ln>
+        </p:spPr>
+        <p:txBody>
+          <a:bodyPr wrap="square" rtlCol="0">
+            <a:spAutoFit/>
+          </a:bodyPr>
+          <a:lstStyle/>
+          <a:p>
+            <a:pPr algn="ctr"/>
+            <a:r>
+              <a:rPr lang="en-US" sz="2800" b="1" dirty="0">
+                <a:solidFill>
+                  <a:schemeClr val="bg1"/>
+                </a:solidFill>
+                <a:latin typeface="Arial" panose="020B0604020202020204" pitchFamily="34" charset="0"/>
+                <a:cs typeface="Arial" panose="020B0604020202020204" pitchFamily="34" charset="0"/>
+              </a:rPr>
+              <a:t>RESPIMATIC 100</a:t>
+            </a:r>
+          </a:p>
+          <a:p>
+            <a:pPr algn="ctr"/>
+            <a:r>
+              <a:rPr lang="en-US" sz="2800" b="1" dirty="0">
+                <a:solidFill>
+                  <a:schemeClr val="bg1"/>
+                </a:solidFill>
+                <a:latin typeface="Arial" panose="020B0604020202020204" pitchFamily="34" charset="0"/>
+                <a:cs typeface="Arial" panose="020B0604020202020204" pitchFamily="34" charset="0"/>
+              </a:rPr>
+              <a:t>PSV Settings Calculator</a:t>
+            </a:r>
+            <a:endParaRPr lang="en-IN" sz="2800" b="1" dirty="0">
+              <a:solidFill>
+                <a:schemeClr val="bg1"/>
+              </a:solidFill>
+              <a:latin typeface="Arial" panose="020B0604020202020204" pitchFamily="34" charset="0"/>
+              <a:cs typeface="Arial" panose="020B0604020202020204" pitchFamily="34" charset="0"/>
+            </a:endParaRPr>
+          </a:p>
+        </p:txBody>
+      </p:sp>
     </p:spTree>
     <p:extLst>
       <p:ext uri="{BB962C8B-B14F-4D97-AF65-F5344CB8AC3E}">

</xml_diff>

<commit_message>
Start changing the name
</commit_message>
<xml_diff>
--- a/common/img/Logo.pptx
+++ b/common/img/Logo.pptx
@@ -7,8 +7,6 @@
   <p:sldIdLst>
     <p:sldId id="256" r:id="rId2"/>
     <p:sldId id="259" r:id="rId3"/>
-    <p:sldId id="257" r:id="rId4"/>
-    <p:sldId id="258" r:id="rId5"/>
   </p:sldIdLst>
   <p:sldSz cx="12192000" cy="6858000"/>
   <p:notesSz cx="6858000" cy="9144000"/>
@@ -264,7 +262,7 @@
           <a:p>
             <a:fld id="{4967892D-CE2D-495A-A9CA-7CB88C831AAA}" type="datetimeFigureOut">
               <a:rPr lang="en-IN" smtClean="0"/>
-              <a:t>17-05-2023</a:t>
+              <a:t>12-12-2023</a:t>
             </a:fld>
             <a:endParaRPr lang="en-IN"/>
           </a:p>
@@ -464,7 +462,7 @@
           <a:p>
             <a:fld id="{4967892D-CE2D-495A-A9CA-7CB88C831AAA}" type="datetimeFigureOut">
               <a:rPr lang="en-IN" smtClean="0"/>
-              <a:t>17-05-2023</a:t>
+              <a:t>12-12-2023</a:t>
             </a:fld>
             <a:endParaRPr lang="en-IN"/>
           </a:p>
@@ -674,7 +672,7 @@
           <a:p>
             <a:fld id="{4967892D-CE2D-495A-A9CA-7CB88C831AAA}" type="datetimeFigureOut">
               <a:rPr lang="en-IN" smtClean="0"/>
-              <a:t>17-05-2023</a:t>
+              <a:t>12-12-2023</a:t>
             </a:fld>
             <a:endParaRPr lang="en-IN"/>
           </a:p>
@@ -874,7 +872,7 @@
           <a:p>
             <a:fld id="{4967892D-CE2D-495A-A9CA-7CB88C831AAA}" type="datetimeFigureOut">
               <a:rPr lang="en-IN" smtClean="0"/>
-              <a:t>17-05-2023</a:t>
+              <a:t>12-12-2023</a:t>
             </a:fld>
             <a:endParaRPr lang="en-IN"/>
           </a:p>
@@ -1150,7 +1148,7 @@
           <a:p>
             <a:fld id="{4967892D-CE2D-495A-A9CA-7CB88C831AAA}" type="datetimeFigureOut">
               <a:rPr lang="en-IN" smtClean="0"/>
-              <a:t>17-05-2023</a:t>
+              <a:t>12-12-2023</a:t>
             </a:fld>
             <a:endParaRPr lang="en-IN"/>
           </a:p>
@@ -1418,7 +1416,7 @@
           <a:p>
             <a:fld id="{4967892D-CE2D-495A-A9CA-7CB88C831AAA}" type="datetimeFigureOut">
               <a:rPr lang="en-IN" smtClean="0"/>
-              <a:t>17-05-2023</a:t>
+              <a:t>12-12-2023</a:t>
             </a:fld>
             <a:endParaRPr lang="en-IN"/>
           </a:p>
@@ -1833,7 +1831,7 @@
           <a:p>
             <a:fld id="{4967892D-CE2D-495A-A9CA-7CB88C831AAA}" type="datetimeFigureOut">
               <a:rPr lang="en-IN" smtClean="0"/>
-              <a:t>17-05-2023</a:t>
+              <a:t>12-12-2023</a:t>
             </a:fld>
             <a:endParaRPr lang="en-IN"/>
           </a:p>
@@ -1975,7 +1973,7 @@
           <a:p>
             <a:fld id="{4967892D-CE2D-495A-A9CA-7CB88C831AAA}" type="datetimeFigureOut">
               <a:rPr lang="en-IN" smtClean="0"/>
-              <a:t>17-05-2023</a:t>
+              <a:t>12-12-2023</a:t>
             </a:fld>
             <a:endParaRPr lang="en-IN"/>
           </a:p>
@@ -2088,7 +2086,7 @@
           <a:p>
             <a:fld id="{4967892D-CE2D-495A-A9CA-7CB88C831AAA}" type="datetimeFigureOut">
               <a:rPr lang="en-IN" smtClean="0"/>
-              <a:t>17-05-2023</a:t>
+              <a:t>12-12-2023</a:t>
             </a:fld>
             <a:endParaRPr lang="en-IN"/>
           </a:p>
@@ -2401,7 +2399,7 @@
           <a:p>
             <a:fld id="{4967892D-CE2D-495A-A9CA-7CB88C831AAA}" type="datetimeFigureOut">
               <a:rPr lang="en-IN" smtClean="0"/>
-              <a:t>17-05-2023</a:t>
+              <a:t>12-12-2023</a:t>
             </a:fld>
             <a:endParaRPr lang="en-IN"/>
           </a:p>
@@ -2690,7 +2688,7 @@
           <a:p>
             <a:fld id="{4967892D-CE2D-495A-A9CA-7CB88C831AAA}" type="datetimeFigureOut">
               <a:rPr lang="en-IN" smtClean="0"/>
-              <a:t>17-05-2023</a:t>
+              <a:t>12-12-2023</a:t>
             </a:fld>
             <a:endParaRPr lang="en-IN"/>
           </a:p>
@@ -2933,7 +2931,7 @@
           <a:p>
             <a:fld id="{4967892D-CE2D-495A-A9CA-7CB88C831AAA}" type="datetimeFigureOut">
               <a:rPr lang="en-IN" smtClean="0"/>
-              <a:t>17-05-2023</a:t>
+              <a:t>12-12-2023</a:t>
             </a:fld>
             <a:endParaRPr lang="en-IN"/>
           </a:p>
@@ -3573,7 +3571,7 @@
                   </a:solidFill>
                   <a:latin typeface="Cera Pro Medium" panose="00000600000000000000" pitchFamily="50" charset="0"/>
                 </a:rPr>
-                <a:t>RESPIMATIC 100 WEB RECORDER</a:t>
+                <a:t>INSPIRE-100 WEB RECORDER</a:t>
               </a:r>
               <a:endParaRPr lang="en-IN" sz="3200" b="1" dirty="0">
                 <a:solidFill>
@@ -4006,7 +4004,7 @@
               <a:avLst/>
             </a:prstGeom>
             <a:solidFill>
-              <a:srgbClr val="0D3E51"/>
+              <a:srgbClr val="1D85AD"/>
             </a:solidFill>
             <a:ln w="28575">
               <a:noFill/>
@@ -4026,7 +4024,7 @@
                   </a:solidFill>
                   <a:latin typeface="Cera Pro Medium" panose="00000600000000000000" pitchFamily="50" charset="0"/>
                 </a:rPr>
-                <a:t>RESPIMATIC 100 WEB DASHBOARD</a:t>
+                <a:t>INSPIRE-100 WEB DASHBOARD</a:t>
               </a:r>
               <a:endParaRPr lang="en-IN" sz="3200" b="1" dirty="0">
                 <a:solidFill>
@@ -4261,7 +4259,7 @@
                   </a:solidFill>
                   <a:latin typeface="Cera Pro Medium" panose="00000600000000000000" pitchFamily="50" charset="0"/>
                 </a:rPr>
-                <a:t>RESPIMATIC 100 WEB ANALYZER</a:t>
+                <a:t>INSPIRE-100 WEB ANALYZER</a:t>
               </a:r>
               <a:endParaRPr lang="en-IN" sz="3200" b="1" dirty="0">
                 <a:solidFill>
@@ -4347,7 +4345,7 @@
                 <a:latin typeface="Arial" panose="020B0604020202020204" pitchFamily="34" charset="0"/>
                 <a:cs typeface="Arial" panose="020B0604020202020204" pitchFamily="34" charset="0"/>
               </a:rPr>
-              <a:t>RESPIMATIC 100</a:t>
+              <a:t>INSPIRE-100</a:t>
             </a:r>
           </a:p>
           <a:p>
@@ -4436,7 +4434,7 @@
                 <a:latin typeface="Arial" panose="020B0604020202020204" pitchFamily="34" charset="0"/>
                 <a:cs typeface="Arial" panose="020B0604020202020204" pitchFamily="34" charset="0"/>
               </a:rPr>
-              <a:t>RESPIMATIC 100 </a:t>
+              <a:t>INSPIRE-100 </a:t>
             </a:r>
             <a:endParaRPr lang="en-IN" sz="2800" b="1" dirty="0">
               <a:solidFill>
@@ -4512,7 +4510,7 @@
                 <a:latin typeface="Arial" panose="020B0604020202020204" pitchFamily="34" charset="0"/>
                 <a:cs typeface="Arial" panose="020B0604020202020204" pitchFamily="34" charset="0"/>
               </a:rPr>
-              <a:t>RESPIMATIC 100 </a:t>
+              <a:t>INSPIRE-100 </a:t>
             </a:r>
             <a:endParaRPr lang="en-IN" sz="2800" b="1" dirty="0">
               <a:solidFill>
@@ -4568,7 +4566,7 @@
                 <a:latin typeface="Arial" panose="020B0604020202020204" pitchFamily="34" charset="0"/>
                 <a:cs typeface="Arial" panose="020B0604020202020204" pitchFamily="34" charset="0"/>
               </a:rPr>
-              <a:t>RESPIMATIC 100</a:t>
+              <a:t>INSPIRE-100</a:t>
             </a:r>
           </a:p>
           <a:p>
@@ -4657,7 +4655,7 @@
                 <a:latin typeface="Arial" panose="020B0604020202020204" pitchFamily="34" charset="0"/>
                 <a:cs typeface="Arial" panose="020B0604020202020204" pitchFamily="34" charset="0"/>
               </a:rPr>
-              <a:t>RESPIMATIC 100</a:t>
+              <a:t>INSPIRE-100</a:t>
             </a:r>
           </a:p>
           <a:p>
@@ -4755,7 +4753,7 @@
                 <a:latin typeface="Arial" panose="020B0604020202020204" pitchFamily="34" charset="0"/>
                 <a:cs typeface="Arial" panose="020B0604020202020204" pitchFamily="34" charset="0"/>
               </a:rPr>
-              <a:t>RESPIMATIC 100</a:t>
+              <a:t>INSPIRE-100</a:t>
             </a:r>
           </a:p>
           <a:p>
@@ -4824,7 +4822,7 @@
                 <a:latin typeface="Arial" panose="020B0604020202020204" pitchFamily="34" charset="0"/>
                 <a:cs typeface="Arial" panose="020B0604020202020204" pitchFamily="34" charset="0"/>
               </a:rPr>
-              <a:t>RESPIMATIC 100</a:t>
+              <a:t>INSPIRE-100</a:t>
             </a:r>
           </a:p>
           <a:p>
@@ -4853,124 +4851,6 @@
     <p:extLst>
       <p:ext uri="{BB962C8B-B14F-4D97-AF65-F5344CB8AC3E}">
         <p14:creationId xmlns:p14="http://schemas.microsoft.com/office/powerpoint/2010/main" val="3728874481"/>
-      </p:ext>
-    </p:extLst>
-  </p:cSld>
-  <p:clrMapOvr>
-    <a:masterClrMapping/>
-  </p:clrMapOvr>
-</p:sld>
-</file>
-
-<file path=ppt/slides/slide3.xml><?xml version="1.0" encoding="utf-8"?>
-<p:sld xmlns:a="http://schemas.openxmlformats.org/drawingml/2006/main" xmlns:r="http://schemas.openxmlformats.org/officeDocument/2006/relationships" xmlns:p="http://schemas.openxmlformats.org/presentationml/2006/main">
-  <p:cSld>
-    <p:spTree>
-      <p:nvGrpSpPr>
-        <p:cNvPr id="1" name=""/>
-        <p:cNvGrpSpPr/>
-        <p:nvPr/>
-      </p:nvGrpSpPr>
-      <p:grpSpPr>
-        <a:xfrm>
-          <a:off x="0" y="0"/>
-          <a:ext cx="0" cy="0"/>
-          <a:chOff x="0" y="0"/>
-          <a:chExt cx="0" cy="0"/>
-        </a:xfrm>
-      </p:grpSpPr>
-      <p:pic>
-        <p:nvPicPr>
-          <p:cNvPr id="23" name="Picture 22">
-            <a:extLst>
-              <a:ext uri="{FF2B5EF4-FFF2-40B4-BE49-F238E27FC236}">
-                <a16:creationId xmlns:a16="http://schemas.microsoft.com/office/drawing/2014/main" id="{05E11863-888C-4408-8812-1A08BBCD8437}"/>
-              </a:ext>
-            </a:extLst>
-          </p:cNvPr>
-          <p:cNvPicPr>
-            <a:picLocks noChangeAspect="1"/>
-          </p:cNvPicPr>
-          <p:nvPr/>
-        </p:nvPicPr>
-        <p:blipFill rotWithShape="1">
-          <a:blip r:embed="rId2"/>
-          <a:srcRect l="1822" r="3894" b="4211"/>
-          <a:stretch/>
-        </p:blipFill>
-        <p:spPr>
-          <a:xfrm>
-            <a:off x="1528010" y="0"/>
-            <a:ext cx="8939463" cy="6569242"/>
-          </a:xfrm>
-          <a:prstGeom prst="rect">
-            <a:avLst/>
-          </a:prstGeom>
-        </p:spPr>
-      </p:pic>
-    </p:spTree>
-    <p:extLst>
-      <p:ext uri="{BB962C8B-B14F-4D97-AF65-F5344CB8AC3E}">
-        <p14:creationId xmlns:p14="http://schemas.microsoft.com/office/powerpoint/2010/main" val="1563633369"/>
-      </p:ext>
-    </p:extLst>
-  </p:cSld>
-  <p:clrMapOvr>
-    <a:masterClrMapping/>
-  </p:clrMapOvr>
-</p:sld>
-</file>
-
-<file path=ppt/slides/slide4.xml><?xml version="1.0" encoding="utf-8"?>
-<p:sld xmlns:a="http://schemas.openxmlformats.org/drawingml/2006/main" xmlns:r="http://schemas.openxmlformats.org/officeDocument/2006/relationships" xmlns:p="http://schemas.openxmlformats.org/presentationml/2006/main">
-  <p:cSld>
-    <p:spTree>
-      <p:nvGrpSpPr>
-        <p:cNvPr id="1" name=""/>
-        <p:cNvGrpSpPr/>
-        <p:nvPr/>
-      </p:nvGrpSpPr>
-      <p:grpSpPr>
-        <a:xfrm>
-          <a:off x="0" y="0"/>
-          <a:ext cx="0" cy="0"/>
-          <a:chOff x="0" y="0"/>
-          <a:chExt cx="0" cy="0"/>
-        </a:xfrm>
-      </p:grpSpPr>
-      <p:pic>
-        <p:nvPicPr>
-          <p:cNvPr id="3" name="Picture 2">
-            <a:extLst>
-              <a:ext uri="{FF2B5EF4-FFF2-40B4-BE49-F238E27FC236}">
-                <a16:creationId xmlns:a16="http://schemas.microsoft.com/office/drawing/2014/main" id="{A17C0C1F-D169-4BAC-8BEC-1DD4C54E8FA2}"/>
-              </a:ext>
-            </a:extLst>
-          </p:cNvPr>
-          <p:cNvPicPr>
-            <a:picLocks noChangeAspect="1"/>
-          </p:cNvPicPr>
-          <p:nvPr/>
-        </p:nvPicPr>
-        <p:blipFill rotWithShape="1">
-          <a:blip r:embed="rId2"/>
-          <a:srcRect l="6190" t="7756" r="10844" b="1433"/>
-          <a:stretch/>
-        </p:blipFill>
-        <p:spPr>
-          <a:xfrm>
-            <a:off x="4522838" y="1622324"/>
-            <a:ext cx="2979175" cy="3883742"/>
-          </a:xfrm>
-          <a:prstGeom prst="rect">
-            <a:avLst/>
-          </a:prstGeom>
-        </p:spPr>
-      </p:pic>
-    </p:spTree>
-    <p:extLst>
-      <p:ext uri="{BB962C8B-B14F-4D97-AF65-F5344CB8AC3E}">
-        <p14:creationId xmlns:p14="http://schemas.microsoft.com/office/powerpoint/2010/main" val="3742178380"/>
       </p:ext>
     </p:extLst>
   </p:cSld>

</xml_diff>

<commit_message>
Changed logo color scheme
</commit_message>
<xml_diff>
--- a/common/img/Logo.pptx
+++ b/common/img/Logo.pptx
@@ -6,11 +6,14 @@
   </p:sldMasterIdLst>
   <p:sldIdLst>
     <p:sldId id="260" r:id="rId2"/>
-    <p:sldId id="263" r:id="rId3"/>
-    <p:sldId id="264" r:id="rId4"/>
-    <p:sldId id="265" r:id="rId5"/>
-    <p:sldId id="261" r:id="rId6"/>
-    <p:sldId id="259" r:id="rId7"/>
+    <p:sldId id="267" r:id="rId3"/>
+    <p:sldId id="268" r:id="rId4"/>
+    <p:sldId id="266" r:id="rId5"/>
+    <p:sldId id="263" r:id="rId6"/>
+    <p:sldId id="264" r:id="rId7"/>
+    <p:sldId id="265" r:id="rId8"/>
+    <p:sldId id="261" r:id="rId9"/>
+    <p:sldId id="259" r:id="rId10"/>
   </p:sldIdLst>
   <p:sldSz cx="12192000" cy="6858000"/>
   <p:notesSz cx="6858000" cy="9144000"/>
@@ -266,7 +269,7 @@
           <a:p>
             <a:fld id="{4967892D-CE2D-495A-A9CA-7CB88C831AAA}" type="datetimeFigureOut">
               <a:rPr lang="en-IN" smtClean="0"/>
-              <a:t>07-01-2024</a:t>
+              <a:t>08-01-2024</a:t>
             </a:fld>
             <a:endParaRPr lang="en-IN"/>
           </a:p>
@@ -466,7 +469,7 @@
           <a:p>
             <a:fld id="{4967892D-CE2D-495A-A9CA-7CB88C831AAA}" type="datetimeFigureOut">
               <a:rPr lang="en-IN" smtClean="0"/>
-              <a:t>07-01-2024</a:t>
+              <a:t>08-01-2024</a:t>
             </a:fld>
             <a:endParaRPr lang="en-IN"/>
           </a:p>
@@ -676,7 +679,7 @@
           <a:p>
             <a:fld id="{4967892D-CE2D-495A-A9CA-7CB88C831AAA}" type="datetimeFigureOut">
               <a:rPr lang="en-IN" smtClean="0"/>
-              <a:t>07-01-2024</a:t>
+              <a:t>08-01-2024</a:t>
             </a:fld>
             <a:endParaRPr lang="en-IN"/>
           </a:p>
@@ -876,7 +879,7 @@
           <a:p>
             <a:fld id="{4967892D-CE2D-495A-A9CA-7CB88C831AAA}" type="datetimeFigureOut">
               <a:rPr lang="en-IN" smtClean="0"/>
-              <a:t>07-01-2024</a:t>
+              <a:t>08-01-2024</a:t>
             </a:fld>
             <a:endParaRPr lang="en-IN"/>
           </a:p>
@@ -1152,7 +1155,7 @@
           <a:p>
             <a:fld id="{4967892D-CE2D-495A-A9CA-7CB88C831AAA}" type="datetimeFigureOut">
               <a:rPr lang="en-IN" smtClean="0"/>
-              <a:t>07-01-2024</a:t>
+              <a:t>08-01-2024</a:t>
             </a:fld>
             <a:endParaRPr lang="en-IN"/>
           </a:p>
@@ -1420,7 +1423,7 @@
           <a:p>
             <a:fld id="{4967892D-CE2D-495A-A9CA-7CB88C831AAA}" type="datetimeFigureOut">
               <a:rPr lang="en-IN" smtClean="0"/>
-              <a:t>07-01-2024</a:t>
+              <a:t>08-01-2024</a:t>
             </a:fld>
             <a:endParaRPr lang="en-IN"/>
           </a:p>
@@ -1835,7 +1838,7 @@
           <a:p>
             <a:fld id="{4967892D-CE2D-495A-A9CA-7CB88C831AAA}" type="datetimeFigureOut">
               <a:rPr lang="en-IN" smtClean="0"/>
-              <a:t>07-01-2024</a:t>
+              <a:t>08-01-2024</a:t>
             </a:fld>
             <a:endParaRPr lang="en-IN"/>
           </a:p>
@@ -1977,7 +1980,7 @@
           <a:p>
             <a:fld id="{4967892D-CE2D-495A-A9CA-7CB88C831AAA}" type="datetimeFigureOut">
               <a:rPr lang="en-IN" smtClean="0"/>
-              <a:t>07-01-2024</a:t>
+              <a:t>08-01-2024</a:t>
             </a:fld>
             <a:endParaRPr lang="en-IN"/>
           </a:p>
@@ -2090,7 +2093,7 @@
           <a:p>
             <a:fld id="{4967892D-CE2D-495A-A9CA-7CB88C831AAA}" type="datetimeFigureOut">
               <a:rPr lang="en-IN" smtClean="0"/>
-              <a:t>07-01-2024</a:t>
+              <a:t>08-01-2024</a:t>
             </a:fld>
             <a:endParaRPr lang="en-IN"/>
           </a:p>
@@ -2403,7 +2406,7 @@
           <a:p>
             <a:fld id="{4967892D-CE2D-495A-A9CA-7CB88C831AAA}" type="datetimeFigureOut">
               <a:rPr lang="en-IN" smtClean="0"/>
-              <a:t>07-01-2024</a:t>
+              <a:t>08-01-2024</a:t>
             </a:fld>
             <a:endParaRPr lang="en-IN"/>
           </a:p>
@@ -2692,7 +2695,7 @@
           <a:p>
             <a:fld id="{4967892D-CE2D-495A-A9CA-7CB88C831AAA}" type="datetimeFigureOut">
               <a:rPr lang="en-IN" smtClean="0"/>
-              <a:t>07-01-2024</a:t>
+              <a:t>08-01-2024</a:t>
             </a:fld>
             <a:endParaRPr lang="en-IN"/>
           </a:p>
@@ -2935,7 +2938,7 @@
           <a:p>
             <a:fld id="{4967892D-CE2D-495A-A9CA-7CB88C831AAA}" type="datetimeFigureOut">
               <a:rPr lang="en-IN" smtClean="0"/>
-              <a:t>07-01-2024</a:t>
+              <a:t>08-01-2024</a:t>
             </a:fld>
             <a:endParaRPr lang="en-IN"/>
           </a:p>
@@ -3354,6 +3357,2249 @@
       </p:grpSpPr>
       <p:grpSp>
         <p:nvGrpSpPr>
+          <p:cNvPr id="51" name="Group 50">
+            <a:extLst>
+              <a:ext uri="{FF2B5EF4-FFF2-40B4-BE49-F238E27FC236}">
+                <a16:creationId xmlns:a16="http://schemas.microsoft.com/office/drawing/2014/main" id="{F70CA307-B570-F110-E460-B1010D9A7ADD}"/>
+              </a:ext>
+            </a:extLst>
+          </p:cNvPr>
+          <p:cNvGrpSpPr/>
+          <p:nvPr/>
+        </p:nvGrpSpPr>
+        <p:grpSpPr>
+          <a:xfrm>
+            <a:off x="2819604" y="130925"/>
+            <a:ext cx="6552784" cy="1805536"/>
+            <a:chOff x="2819604" y="130925"/>
+            <a:chExt cx="6552784" cy="1805536"/>
+          </a:xfrm>
+        </p:grpSpPr>
+        <p:pic>
+          <p:nvPicPr>
+            <p:cNvPr id="26" name="Picture 25">
+              <a:extLst>
+                <a:ext uri="{FF2B5EF4-FFF2-40B4-BE49-F238E27FC236}">
+                  <a16:creationId xmlns:a16="http://schemas.microsoft.com/office/drawing/2014/main" id="{C9DDA8A0-94B0-6742-B0C8-61A9368B0518}"/>
+                </a:ext>
+              </a:extLst>
+            </p:cNvPr>
+            <p:cNvPicPr>
+              <a:picLocks noChangeAspect="1"/>
+            </p:cNvPicPr>
+            <p:nvPr/>
+          </p:nvPicPr>
+          <p:blipFill>
+            <a:blip r:embed="rId2"/>
+            <a:stretch>
+              <a:fillRect/>
+            </a:stretch>
+          </p:blipFill>
+          <p:spPr>
+            <a:xfrm>
+              <a:off x="2819607" y="841680"/>
+              <a:ext cx="1094780" cy="1094781"/>
+            </a:xfrm>
+            <a:prstGeom prst="rect">
+              <a:avLst/>
+            </a:prstGeom>
+          </p:spPr>
+        </p:pic>
+        <p:sp>
+          <p:nvSpPr>
+            <p:cNvPr id="35" name="Rectangle 34">
+              <a:extLst>
+                <a:ext uri="{FF2B5EF4-FFF2-40B4-BE49-F238E27FC236}">
+                  <a16:creationId xmlns:a16="http://schemas.microsoft.com/office/drawing/2014/main" id="{246C8107-3922-2394-EA70-4E4F7EE9AD63}"/>
+                </a:ext>
+              </a:extLst>
+            </p:cNvPr>
+            <p:cNvSpPr/>
+            <p:nvPr/>
+          </p:nvSpPr>
+          <p:spPr>
+            <a:xfrm>
+              <a:off x="2819605" y="234520"/>
+              <a:ext cx="6552783" cy="607309"/>
+            </a:xfrm>
+            <a:prstGeom prst="rect">
+              <a:avLst/>
+            </a:prstGeom>
+            <a:solidFill>
+              <a:srgbClr val="0D3E51"/>
+            </a:solidFill>
+            <a:ln>
+              <a:noFill/>
+            </a:ln>
+          </p:spPr>
+          <p:style>
+            <a:lnRef idx="2">
+              <a:schemeClr val="accent1">
+                <a:shade val="15000"/>
+              </a:schemeClr>
+            </a:lnRef>
+            <a:fillRef idx="1">
+              <a:schemeClr val="accent1"/>
+            </a:fillRef>
+            <a:effectRef idx="0">
+              <a:schemeClr val="accent1"/>
+            </a:effectRef>
+            <a:fontRef idx="minor">
+              <a:schemeClr val="lt1"/>
+            </a:fontRef>
+          </p:style>
+          <p:txBody>
+            <a:bodyPr rtlCol="0" anchor="ctr"/>
+            <a:lstStyle/>
+            <a:p>
+              <a:pPr algn="ctr"/>
+              <a:endParaRPr lang="en-IN"/>
+            </a:p>
+          </p:txBody>
+        </p:sp>
+        <p:sp>
+          <p:nvSpPr>
+            <p:cNvPr id="9" name="Rectangle 8">
+              <a:extLst>
+                <a:ext uri="{FF2B5EF4-FFF2-40B4-BE49-F238E27FC236}">
+                  <a16:creationId xmlns:a16="http://schemas.microsoft.com/office/drawing/2014/main" id="{9FCC845F-1106-5691-5BD0-1A5B88E09ABA}"/>
+                </a:ext>
+              </a:extLst>
+            </p:cNvPr>
+            <p:cNvSpPr>
+              <a:spLocks noChangeAspect="1"/>
+            </p:cNvSpPr>
+            <p:nvPr/>
+          </p:nvSpPr>
+          <p:spPr>
+            <a:xfrm>
+              <a:off x="3914386" y="841829"/>
+              <a:ext cx="5458002" cy="1094632"/>
+            </a:xfrm>
+            <a:prstGeom prst="rect">
+              <a:avLst/>
+            </a:prstGeom>
+            <a:solidFill>
+              <a:srgbClr val="5B7C99"/>
+            </a:solidFill>
+            <a:ln w="28575">
+              <a:noFill/>
+            </a:ln>
+          </p:spPr>
+          <p:style>
+            <a:lnRef idx="2">
+              <a:schemeClr val="accent1">
+                <a:shade val="15000"/>
+              </a:schemeClr>
+            </a:lnRef>
+            <a:fillRef idx="1">
+              <a:schemeClr val="accent1"/>
+            </a:fillRef>
+            <a:effectRef idx="0">
+              <a:schemeClr val="accent1"/>
+            </a:effectRef>
+            <a:fontRef idx="minor">
+              <a:schemeClr val="lt1"/>
+            </a:fontRef>
+          </p:style>
+          <p:txBody>
+            <a:bodyPr rtlCol="0" anchor="ctr"/>
+            <a:lstStyle/>
+            <a:p>
+              <a:pPr algn="ctr"/>
+              <a:endParaRPr lang="en-IN" dirty="0"/>
+            </a:p>
+          </p:txBody>
+        </p:sp>
+        <p:sp>
+          <p:nvSpPr>
+            <p:cNvPr id="11" name="TextBox 10">
+              <a:extLst>
+                <a:ext uri="{FF2B5EF4-FFF2-40B4-BE49-F238E27FC236}">
+                  <a16:creationId xmlns:a16="http://schemas.microsoft.com/office/drawing/2014/main" id="{EA906BE6-1FF2-F802-E2DA-655F33BA0B66}"/>
+                </a:ext>
+              </a:extLst>
+            </p:cNvPr>
+            <p:cNvSpPr txBox="1"/>
+            <p:nvPr/>
+          </p:nvSpPr>
+          <p:spPr>
+            <a:xfrm>
+              <a:off x="3914386" y="838811"/>
+              <a:ext cx="5458002" cy="923330"/>
+            </a:xfrm>
+            <a:prstGeom prst="rect">
+              <a:avLst/>
+            </a:prstGeom>
+            <a:noFill/>
+          </p:spPr>
+          <p:txBody>
+            <a:bodyPr wrap="square" rtlCol="0">
+              <a:spAutoFit/>
+            </a:bodyPr>
+            <a:lstStyle/>
+            <a:p>
+              <a:pPr algn="ctr"/>
+              <a:r>
+                <a:rPr lang="en-US" sz="5400" dirty="0" err="1">
+                  <a:solidFill>
+                    <a:srgbClr val="EEF4ED"/>
+                  </a:solidFill>
+                  <a:latin typeface="Rockwell Extra Bold" panose="02060903040505020403" pitchFamily="18" charset="0"/>
+                </a:rPr>
+                <a:t>tek</a:t>
+              </a:r>
+              <a:r>
+                <a:rPr lang="en-US" sz="5400" dirty="0" err="1">
+                  <a:solidFill>
+                    <a:srgbClr val="EEF4ED"/>
+                  </a:solidFill>
+                  <a:latin typeface="Rockwell" panose="02060603020205020403" pitchFamily="18" charset="0"/>
+                </a:rPr>
+                <a:t>Medika</a:t>
+              </a:r>
+              <a:endParaRPr lang="en-IN" sz="4800" dirty="0">
+                <a:solidFill>
+                  <a:srgbClr val="EEF4ED"/>
+                </a:solidFill>
+                <a:latin typeface="Rockwell" panose="02060603020205020403" pitchFamily="18" charset="0"/>
+              </a:endParaRPr>
+            </a:p>
+          </p:txBody>
+        </p:sp>
+        <p:sp>
+          <p:nvSpPr>
+            <p:cNvPr id="16" name="TextBox 15">
+              <a:extLst>
+                <a:ext uri="{FF2B5EF4-FFF2-40B4-BE49-F238E27FC236}">
+                  <a16:creationId xmlns:a16="http://schemas.microsoft.com/office/drawing/2014/main" id="{2778DF63-4498-0961-AF10-B6A31C091514}"/>
+                </a:ext>
+              </a:extLst>
+            </p:cNvPr>
+            <p:cNvSpPr txBox="1"/>
+            <p:nvPr/>
+          </p:nvSpPr>
+          <p:spPr>
+            <a:xfrm>
+              <a:off x="2819604" y="130925"/>
+              <a:ext cx="6552781" cy="707886"/>
+            </a:xfrm>
+            <a:prstGeom prst="rect">
+              <a:avLst/>
+            </a:prstGeom>
+            <a:solidFill>
+              <a:srgbClr val="2C94BC"/>
+            </a:solidFill>
+            <a:ln w="28575">
+              <a:noFill/>
+            </a:ln>
+          </p:spPr>
+          <p:txBody>
+            <a:bodyPr wrap="square" rtlCol="0">
+              <a:spAutoFit/>
+            </a:bodyPr>
+            <a:lstStyle/>
+            <a:p>
+              <a:pPr algn="ctr"/>
+              <a:r>
+                <a:rPr lang="en-US" sz="4000" b="1" dirty="0">
+                  <a:solidFill>
+                    <a:srgbClr val="EEF4ED"/>
+                  </a:solidFill>
+                  <a:latin typeface="Cera Pro Medium" panose="00000600000000000000" pitchFamily="50" charset="0"/>
+                </a:rPr>
+                <a:t>INSPIRE-100 </a:t>
+              </a:r>
+              <a:r>
+                <a:rPr lang="en-US" sz="4000" i="1" dirty="0">
+                  <a:solidFill>
+                    <a:srgbClr val="EEF4ED"/>
+                  </a:solidFill>
+                  <a:latin typeface="Cera Pro Medium" panose="00000600000000000000" pitchFamily="50" charset="0"/>
+                </a:rPr>
+                <a:t>Web Applications</a:t>
+              </a:r>
+              <a:endParaRPr lang="en-IN" sz="4000" i="1" dirty="0">
+                <a:solidFill>
+                  <a:srgbClr val="EEF4ED"/>
+                </a:solidFill>
+                <a:latin typeface="Cera Pro Medium" panose="00000600000000000000" pitchFamily="50" charset="0"/>
+              </a:endParaRPr>
+            </a:p>
+          </p:txBody>
+        </p:sp>
+      </p:grpSp>
+      <p:grpSp>
+        <p:nvGrpSpPr>
+          <p:cNvPr id="52" name="Group 51">
+            <a:extLst>
+              <a:ext uri="{FF2B5EF4-FFF2-40B4-BE49-F238E27FC236}">
+                <a16:creationId xmlns:a16="http://schemas.microsoft.com/office/drawing/2014/main" id="{F8E8A685-6814-575D-58D3-1655CB02066B}"/>
+              </a:ext>
+            </a:extLst>
+          </p:cNvPr>
+          <p:cNvGrpSpPr/>
+          <p:nvPr/>
+        </p:nvGrpSpPr>
+        <p:grpSpPr>
+          <a:xfrm>
+            <a:off x="2819604" y="2271151"/>
+            <a:ext cx="6552784" cy="1805536"/>
+            <a:chOff x="2819604" y="130925"/>
+            <a:chExt cx="6552784" cy="1805536"/>
+          </a:xfrm>
+        </p:grpSpPr>
+        <p:pic>
+          <p:nvPicPr>
+            <p:cNvPr id="53" name="Picture 52">
+              <a:extLst>
+                <a:ext uri="{FF2B5EF4-FFF2-40B4-BE49-F238E27FC236}">
+                  <a16:creationId xmlns:a16="http://schemas.microsoft.com/office/drawing/2014/main" id="{9AF731A8-3FB1-09CC-ADCB-3A63F2EB5FD4}"/>
+                </a:ext>
+              </a:extLst>
+            </p:cNvPr>
+            <p:cNvPicPr>
+              <a:picLocks noChangeAspect="1"/>
+            </p:cNvPicPr>
+            <p:nvPr/>
+          </p:nvPicPr>
+          <p:blipFill>
+            <a:blip r:embed="rId2"/>
+            <a:stretch>
+              <a:fillRect/>
+            </a:stretch>
+          </p:blipFill>
+          <p:spPr>
+            <a:xfrm>
+              <a:off x="2819607" y="841680"/>
+              <a:ext cx="1094780" cy="1094781"/>
+            </a:xfrm>
+            <a:prstGeom prst="rect">
+              <a:avLst/>
+            </a:prstGeom>
+          </p:spPr>
+        </p:pic>
+        <p:sp>
+          <p:nvSpPr>
+            <p:cNvPr id="54" name="Rectangle 53">
+              <a:extLst>
+                <a:ext uri="{FF2B5EF4-FFF2-40B4-BE49-F238E27FC236}">
+                  <a16:creationId xmlns:a16="http://schemas.microsoft.com/office/drawing/2014/main" id="{1EE30CE6-09B1-67AC-7E57-334FE2FEA27A}"/>
+                </a:ext>
+              </a:extLst>
+            </p:cNvPr>
+            <p:cNvSpPr/>
+            <p:nvPr/>
+          </p:nvSpPr>
+          <p:spPr>
+            <a:xfrm>
+              <a:off x="2819605" y="234520"/>
+              <a:ext cx="6552783" cy="607309"/>
+            </a:xfrm>
+            <a:prstGeom prst="rect">
+              <a:avLst/>
+            </a:prstGeom>
+            <a:solidFill>
+              <a:srgbClr val="0D3E51"/>
+            </a:solidFill>
+            <a:ln>
+              <a:noFill/>
+            </a:ln>
+          </p:spPr>
+          <p:style>
+            <a:lnRef idx="2">
+              <a:schemeClr val="accent1">
+                <a:shade val="15000"/>
+              </a:schemeClr>
+            </a:lnRef>
+            <a:fillRef idx="1">
+              <a:schemeClr val="accent1"/>
+            </a:fillRef>
+            <a:effectRef idx="0">
+              <a:schemeClr val="accent1"/>
+            </a:effectRef>
+            <a:fontRef idx="minor">
+              <a:schemeClr val="lt1"/>
+            </a:fontRef>
+          </p:style>
+          <p:txBody>
+            <a:bodyPr rtlCol="0" anchor="ctr"/>
+            <a:lstStyle/>
+            <a:p>
+              <a:pPr algn="ctr"/>
+              <a:endParaRPr lang="en-IN"/>
+            </a:p>
+          </p:txBody>
+        </p:sp>
+        <p:sp>
+          <p:nvSpPr>
+            <p:cNvPr id="55" name="Rectangle 54">
+              <a:extLst>
+                <a:ext uri="{FF2B5EF4-FFF2-40B4-BE49-F238E27FC236}">
+                  <a16:creationId xmlns:a16="http://schemas.microsoft.com/office/drawing/2014/main" id="{85B49DF7-A214-C486-2C99-187842BA787C}"/>
+                </a:ext>
+              </a:extLst>
+            </p:cNvPr>
+            <p:cNvSpPr>
+              <a:spLocks noChangeAspect="1"/>
+            </p:cNvSpPr>
+            <p:nvPr/>
+          </p:nvSpPr>
+          <p:spPr>
+            <a:xfrm>
+              <a:off x="3914386" y="841829"/>
+              <a:ext cx="5458002" cy="1094632"/>
+            </a:xfrm>
+            <a:prstGeom prst="rect">
+              <a:avLst/>
+            </a:prstGeom>
+            <a:solidFill>
+              <a:srgbClr val="5B7C99"/>
+            </a:solidFill>
+            <a:ln w="28575">
+              <a:noFill/>
+            </a:ln>
+          </p:spPr>
+          <p:style>
+            <a:lnRef idx="2">
+              <a:schemeClr val="accent1">
+                <a:shade val="15000"/>
+              </a:schemeClr>
+            </a:lnRef>
+            <a:fillRef idx="1">
+              <a:schemeClr val="accent1"/>
+            </a:fillRef>
+            <a:effectRef idx="0">
+              <a:schemeClr val="accent1"/>
+            </a:effectRef>
+            <a:fontRef idx="minor">
+              <a:schemeClr val="lt1"/>
+            </a:fontRef>
+          </p:style>
+          <p:txBody>
+            <a:bodyPr rtlCol="0" anchor="ctr"/>
+            <a:lstStyle/>
+            <a:p>
+              <a:pPr algn="ctr"/>
+              <a:endParaRPr lang="en-IN" dirty="0"/>
+            </a:p>
+          </p:txBody>
+        </p:sp>
+        <p:sp>
+          <p:nvSpPr>
+            <p:cNvPr id="56" name="TextBox 55">
+              <a:extLst>
+                <a:ext uri="{FF2B5EF4-FFF2-40B4-BE49-F238E27FC236}">
+                  <a16:creationId xmlns:a16="http://schemas.microsoft.com/office/drawing/2014/main" id="{B8942939-9FFF-4904-025B-5B8185E32EB4}"/>
+                </a:ext>
+              </a:extLst>
+            </p:cNvPr>
+            <p:cNvSpPr txBox="1"/>
+            <p:nvPr/>
+          </p:nvSpPr>
+          <p:spPr>
+            <a:xfrm>
+              <a:off x="3914386" y="838811"/>
+              <a:ext cx="5458002" cy="923330"/>
+            </a:xfrm>
+            <a:prstGeom prst="rect">
+              <a:avLst/>
+            </a:prstGeom>
+            <a:noFill/>
+          </p:spPr>
+          <p:txBody>
+            <a:bodyPr wrap="square" rtlCol="0">
+              <a:spAutoFit/>
+            </a:bodyPr>
+            <a:lstStyle/>
+            <a:p>
+              <a:pPr algn="ctr"/>
+              <a:r>
+                <a:rPr lang="en-US" sz="5400" dirty="0" err="1">
+                  <a:solidFill>
+                    <a:srgbClr val="EEF4ED"/>
+                  </a:solidFill>
+                  <a:latin typeface="Rockwell Extra Bold" panose="02060903040505020403" pitchFamily="18" charset="0"/>
+                </a:rPr>
+                <a:t>tek</a:t>
+              </a:r>
+              <a:r>
+                <a:rPr lang="en-US" sz="5400" dirty="0" err="1">
+                  <a:solidFill>
+                    <a:srgbClr val="EEF4ED"/>
+                  </a:solidFill>
+                  <a:latin typeface="Rockwell" panose="02060603020205020403" pitchFamily="18" charset="0"/>
+                </a:rPr>
+                <a:t>Medika</a:t>
+              </a:r>
+              <a:endParaRPr lang="en-IN" sz="4800" dirty="0">
+                <a:solidFill>
+                  <a:srgbClr val="EEF4ED"/>
+                </a:solidFill>
+                <a:latin typeface="Rockwell" panose="02060603020205020403" pitchFamily="18" charset="0"/>
+              </a:endParaRPr>
+            </a:p>
+          </p:txBody>
+        </p:sp>
+        <p:sp>
+          <p:nvSpPr>
+            <p:cNvPr id="57" name="TextBox 56">
+              <a:extLst>
+                <a:ext uri="{FF2B5EF4-FFF2-40B4-BE49-F238E27FC236}">
+                  <a16:creationId xmlns:a16="http://schemas.microsoft.com/office/drawing/2014/main" id="{BDB379CC-A5B8-E7DB-BBB5-0FFC818BDD96}"/>
+                </a:ext>
+              </a:extLst>
+            </p:cNvPr>
+            <p:cNvSpPr txBox="1"/>
+            <p:nvPr/>
+          </p:nvSpPr>
+          <p:spPr>
+            <a:xfrm>
+              <a:off x="2819604" y="130925"/>
+              <a:ext cx="6552781" cy="707886"/>
+            </a:xfrm>
+            <a:prstGeom prst="rect">
+              <a:avLst/>
+            </a:prstGeom>
+            <a:solidFill>
+              <a:srgbClr val="2C94BC"/>
+            </a:solidFill>
+            <a:ln w="28575">
+              <a:noFill/>
+            </a:ln>
+          </p:spPr>
+          <p:txBody>
+            <a:bodyPr wrap="square" rtlCol="0">
+              <a:spAutoFit/>
+            </a:bodyPr>
+            <a:lstStyle/>
+            <a:p>
+              <a:pPr algn="ctr"/>
+              <a:r>
+                <a:rPr lang="en-US" sz="4000" b="1" dirty="0">
+                  <a:solidFill>
+                    <a:srgbClr val="EEF4ED"/>
+                  </a:solidFill>
+                  <a:latin typeface="Cera Pro Medium" panose="00000600000000000000" pitchFamily="50" charset="0"/>
+                </a:rPr>
+                <a:t>INSPIRE-100               </a:t>
+              </a:r>
+              <a:r>
+                <a:rPr lang="en-US" sz="4000" i="1" dirty="0">
+                  <a:solidFill>
+                    <a:srgbClr val="EEF4ED"/>
+                  </a:solidFill>
+                  <a:latin typeface="Cera Pro Medium" panose="00000600000000000000" pitchFamily="50" charset="0"/>
+                </a:rPr>
+                <a:t>Firmware</a:t>
+              </a:r>
+              <a:endParaRPr lang="en-IN" sz="4000" i="1" dirty="0">
+                <a:solidFill>
+                  <a:srgbClr val="EEF4ED"/>
+                </a:solidFill>
+                <a:latin typeface="Cera Pro Medium" panose="00000600000000000000" pitchFamily="50" charset="0"/>
+              </a:endParaRPr>
+            </a:p>
+          </p:txBody>
+        </p:sp>
+      </p:grpSp>
+      <p:grpSp>
+        <p:nvGrpSpPr>
+          <p:cNvPr id="58" name="Group 57">
+            <a:extLst>
+              <a:ext uri="{FF2B5EF4-FFF2-40B4-BE49-F238E27FC236}">
+                <a16:creationId xmlns:a16="http://schemas.microsoft.com/office/drawing/2014/main" id="{58465A5A-9CD2-A4AF-6530-2674C2DF4581}"/>
+              </a:ext>
+            </a:extLst>
+          </p:cNvPr>
+          <p:cNvGrpSpPr/>
+          <p:nvPr/>
+        </p:nvGrpSpPr>
+        <p:grpSpPr>
+          <a:xfrm>
+            <a:off x="2819601" y="4408359"/>
+            <a:ext cx="6552784" cy="1805536"/>
+            <a:chOff x="2819604" y="130925"/>
+            <a:chExt cx="6552784" cy="1805536"/>
+          </a:xfrm>
+        </p:grpSpPr>
+        <p:pic>
+          <p:nvPicPr>
+            <p:cNvPr id="59" name="Picture 58">
+              <a:extLst>
+                <a:ext uri="{FF2B5EF4-FFF2-40B4-BE49-F238E27FC236}">
+                  <a16:creationId xmlns:a16="http://schemas.microsoft.com/office/drawing/2014/main" id="{FB57AE9B-1C75-9C14-574C-C89A389C7F95}"/>
+                </a:ext>
+              </a:extLst>
+            </p:cNvPr>
+            <p:cNvPicPr>
+              <a:picLocks noChangeAspect="1"/>
+            </p:cNvPicPr>
+            <p:nvPr/>
+          </p:nvPicPr>
+          <p:blipFill>
+            <a:blip r:embed="rId2"/>
+            <a:stretch>
+              <a:fillRect/>
+            </a:stretch>
+          </p:blipFill>
+          <p:spPr>
+            <a:xfrm>
+              <a:off x="2819607" y="841680"/>
+              <a:ext cx="1094780" cy="1094781"/>
+            </a:xfrm>
+            <a:prstGeom prst="rect">
+              <a:avLst/>
+            </a:prstGeom>
+          </p:spPr>
+        </p:pic>
+        <p:sp>
+          <p:nvSpPr>
+            <p:cNvPr id="60" name="Rectangle 59">
+              <a:extLst>
+                <a:ext uri="{FF2B5EF4-FFF2-40B4-BE49-F238E27FC236}">
+                  <a16:creationId xmlns:a16="http://schemas.microsoft.com/office/drawing/2014/main" id="{DC3F2677-6545-2B0A-2F31-069403BD323A}"/>
+                </a:ext>
+              </a:extLst>
+            </p:cNvPr>
+            <p:cNvSpPr/>
+            <p:nvPr/>
+          </p:nvSpPr>
+          <p:spPr>
+            <a:xfrm>
+              <a:off x="2819605" y="234520"/>
+              <a:ext cx="6552783" cy="607309"/>
+            </a:xfrm>
+            <a:prstGeom prst="rect">
+              <a:avLst/>
+            </a:prstGeom>
+            <a:solidFill>
+              <a:srgbClr val="0D3E51"/>
+            </a:solidFill>
+            <a:ln>
+              <a:noFill/>
+            </a:ln>
+          </p:spPr>
+          <p:style>
+            <a:lnRef idx="2">
+              <a:schemeClr val="accent1">
+                <a:shade val="15000"/>
+              </a:schemeClr>
+            </a:lnRef>
+            <a:fillRef idx="1">
+              <a:schemeClr val="accent1"/>
+            </a:fillRef>
+            <a:effectRef idx="0">
+              <a:schemeClr val="accent1"/>
+            </a:effectRef>
+            <a:fontRef idx="minor">
+              <a:schemeClr val="lt1"/>
+            </a:fontRef>
+          </p:style>
+          <p:txBody>
+            <a:bodyPr rtlCol="0" anchor="ctr"/>
+            <a:lstStyle/>
+            <a:p>
+              <a:pPr algn="ctr"/>
+              <a:endParaRPr lang="en-IN"/>
+            </a:p>
+          </p:txBody>
+        </p:sp>
+        <p:sp>
+          <p:nvSpPr>
+            <p:cNvPr id="61" name="Rectangle 60">
+              <a:extLst>
+                <a:ext uri="{FF2B5EF4-FFF2-40B4-BE49-F238E27FC236}">
+                  <a16:creationId xmlns:a16="http://schemas.microsoft.com/office/drawing/2014/main" id="{83B85113-96DE-7C4A-63DB-B72E3C2DC000}"/>
+                </a:ext>
+              </a:extLst>
+            </p:cNvPr>
+            <p:cNvSpPr>
+              <a:spLocks noChangeAspect="1"/>
+            </p:cNvSpPr>
+            <p:nvPr/>
+          </p:nvSpPr>
+          <p:spPr>
+            <a:xfrm>
+              <a:off x="3914386" y="841829"/>
+              <a:ext cx="5458002" cy="1094632"/>
+            </a:xfrm>
+            <a:prstGeom prst="rect">
+              <a:avLst/>
+            </a:prstGeom>
+            <a:solidFill>
+              <a:srgbClr val="5B7C99"/>
+            </a:solidFill>
+            <a:ln w="28575">
+              <a:noFill/>
+            </a:ln>
+          </p:spPr>
+          <p:style>
+            <a:lnRef idx="2">
+              <a:schemeClr val="accent1">
+                <a:shade val="15000"/>
+              </a:schemeClr>
+            </a:lnRef>
+            <a:fillRef idx="1">
+              <a:schemeClr val="accent1"/>
+            </a:fillRef>
+            <a:effectRef idx="0">
+              <a:schemeClr val="accent1"/>
+            </a:effectRef>
+            <a:fontRef idx="minor">
+              <a:schemeClr val="lt1"/>
+            </a:fontRef>
+          </p:style>
+          <p:txBody>
+            <a:bodyPr rtlCol="0" anchor="ctr"/>
+            <a:lstStyle/>
+            <a:p>
+              <a:pPr algn="ctr"/>
+              <a:endParaRPr lang="en-IN" dirty="0"/>
+            </a:p>
+          </p:txBody>
+        </p:sp>
+        <p:sp>
+          <p:nvSpPr>
+            <p:cNvPr id="62" name="TextBox 61">
+              <a:extLst>
+                <a:ext uri="{FF2B5EF4-FFF2-40B4-BE49-F238E27FC236}">
+                  <a16:creationId xmlns:a16="http://schemas.microsoft.com/office/drawing/2014/main" id="{AFB552A6-DCF4-0D1F-6044-BF14DE52FA52}"/>
+                </a:ext>
+              </a:extLst>
+            </p:cNvPr>
+            <p:cNvSpPr txBox="1"/>
+            <p:nvPr/>
+          </p:nvSpPr>
+          <p:spPr>
+            <a:xfrm>
+              <a:off x="3914386" y="838811"/>
+              <a:ext cx="5458002" cy="923330"/>
+            </a:xfrm>
+            <a:prstGeom prst="rect">
+              <a:avLst/>
+            </a:prstGeom>
+            <a:noFill/>
+          </p:spPr>
+          <p:txBody>
+            <a:bodyPr wrap="square" rtlCol="0">
+              <a:spAutoFit/>
+            </a:bodyPr>
+            <a:lstStyle/>
+            <a:p>
+              <a:pPr algn="ctr"/>
+              <a:r>
+                <a:rPr lang="en-US" sz="5400" dirty="0" err="1">
+                  <a:solidFill>
+                    <a:srgbClr val="EEF4ED"/>
+                  </a:solidFill>
+                  <a:latin typeface="Rockwell Extra Bold" panose="02060903040505020403" pitchFamily="18" charset="0"/>
+                </a:rPr>
+                <a:t>tek</a:t>
+              </a:r>
+              <a:r>
+                <a:rPr lang="en-US" sz="5400" dirty="0" err="1">
+                  <a:solidFill>
+                    <a:srgbClr val="EEF4ED"/>
+                  </a:solidFill>
+                  <a:latin typeface="Rockwell" panose="02060603020205020403" pitchFamily="18" charset="0"/>
+                </a:rPr>
+                <a:t>Medika</a:t>
+              </a:r>
+              <a:endParaRPr lang="en-IN" sz="4800" dirty="0">
+                <a:solidFill>
+                  <a:srgbClr val="EEF4ED"/>
+                </a:solidFill>
+                <a:latin typeface="Rockwell" panose="02060603020205020403" pitchFamily="18" charset="0"/>
+              </a:endParaRPr>
+            </a:p>
+          </p:txBody>
+        </p:sp>
+        <p:sp>
+          <p:nvSpPr>
+            <p:cNvPr id="63" name="TextBox 62">
+              <a:extLst>
+                <a:ext uri="{FF2B5EF4-FFF2-40B4-BE49-F238E27FC236}">
+                  <a16:creationId xmlns:a16="http://schemas.microsoft.com/office/drawing/2014/main" id="{B16C4C08-001D-8415-EE1E-32F415E1FF0B}"/>
+                </a:ext>
+              </a:extLst>
+            </p:cNvPr>
+            <p:cNvSpPr txBox="1"/>
+            <p:nvPr/>
+          </p:nvSpPr>
+          <p:spPr>
+            <a:xfrm>
+              <a:off x="2819604" y="130925"/>
+              <a:ext cx="6552781" cy="707886"/>
+            </a:xfrm>
+            <a:prstGeom prst="rect">
+              <a:avLst/>
+            </a:prstGeom>
+            <a:solidFill>
+              <a:srgbClr val="2C94BC"/>
+            </a:solidFill>
+            <a:ln w="28575">
+              <a:noFill/>
+            </a:ln>
+          </p:spPr>
+          <p:txBody>
+            <a:bodyPr wrap="square" rtlCol="0">
+              <a:spAutoFit/>
+            </a:bodyPr>
+            <a:lstStyle/>
+            <a:p>
+              <a:pPr algn="ctr"/>
+              <a:r>
+                <a:rPr lang="en-US" sz="4000" b="1" dirty="0">
+                  <a:solidFill>
+                    <a:srgbClr val="EEF4ED"/>
+                  </a:solidFill>
+                  <a:latin typeface="Cera Pro Medium" panose="00000600000000000000" pitchFamily="50" charset="0"/>
+                </a:rPr>
+                <a:t>INSPIRE-100    </a:t>
+              </a:r>
+              <a:r>
+                <a:rPr lang="en-US" sz="4000" i="1" dirty="0">
+                  <a:solidFill>
+                    <a:srgbClr val="EEF4ED"/>
+                  </a:solidFill>
+                  <a:latin typeface="Cera Pro Medium" panose="00000600000000000000" pitchFamily="50" charset="0"/>
+                </a:rPr>
+                <a:t>Documentation</a:t>
+              </a:r>
+              <a:endParaRPr lang="en-IN" sz="4000" i="1" dirty="0">
+                <a:solidFill>
+                  <a:srgbClr val="EEF4ED"/>
+                </a:solidFill>
+                <a:latin typeface="Cera Pro Medium" panose="00000600000000000000" pitchFamily="50" charset="0"/>
+              </a:endParaRPr>
+            </a:p>
+          </p:txBody>
+        </p:sp>
+      </p:grpSp>
+    </p:spTree>
+    <p:extLst>
+      <p:ext uri="{BB962C8B-B14F-4D97-AF65-F5344CB8AC3E}">
+        <p14:creationId xmlns:p14="http://schemas.microsoft.com/office/powerpoint/2010/main" val="1887048"/>
+      </p:ext>
+    </p:extLst>
+  </p:cSld>
+  <p:clrMapOvr>
+    <a:masterClrMapping/>
+  </p:clrMapOvr>
+</p:sld>
+</file>
+
+<file path=ppt/slides/slide2.xml><?xml version="1.0" encoding="utf-8"?>
+<p:sld xmlns:a="http://schemas.openxmlformats.org/drawingml/2006/main" xmlns:r="http://schemas.openxmlformats.org/officeDocument/2006/relationships" xmlns:p="http://schemas.openxmlformats.org/presentationml/2006/main">
+  <p:cSld>
+    <p:spTree>
+      <p:nvGrpSpPr>
+        <p:cNvPr id="1" name=""/>
+        <p:cNvGrpSpPr/>
+        <p:nvPr/>
+      </p:nvGrpSpPr>
+      <p:grpSpPr>
+        <a:xfrm>
+          <a:off x="0" y="0"/>
+          <a:ext cx="0" cy="0"/>
+          <a:chOff x="0" y="0"/>
+          <a:chExt cx="0" cy="0"/>
+        </a:xfrm>
+      </p:grpSpPr>
+      <p:grpSp>
+        <p:nvGrpSpPr>
+          <p:cNvPr id="24" name="Group 23">
+            <a:extLst>
+              <a:ext uri="{FF2B5EF4-FFF2-40B4-BE49-F238E27FC236}">
+                <a16:creationId xmlns:a16="http://schemas.microsoft.com/office/drawing/2014/main" id="{B236847F-412A-34C4-B5F4-039F21BCCB1B}"/>
+              </a:ext>
+            </a:extLst>
+          </p:cNvPr>
+          <p:cNvGrpSpPr/>
+          <p:nvPr/>
+        </p:nvGrpSpPr>
+        <p:grpSpPr>
+          <a:xfrm>
+            <a:off x="2819605" y="683281"/>
+            <a:ext cx="6552784" cy="1805536"/>
+            <a:chOff x="2819604" y="130925"/>
+            <a:chExt cx="6552784" cy="1805536"/>
+          </a:xfrm>
+        </p:grpSpPr>
+        <p:pic>
+          <p:nvPicPr>
+            <p:cNvPr id="25" name="Picture 24">
+              <a:extLst>
+                <a:ext uri="{FF2B5EF4-FFF2-40B4-BE49-F238E27FC236}">
+                  <a16:creationId xmlns:a16="http://schemas.microsoft.com/office/drawing/2014/main" id="{1897D017-4841-1911-86D5-804734442DD5}"/>
+                </a:ext>
+              </a:extLst>
+            </p:cNvPr>
+            <p:cNvPicPr>
+              <a:picLocks noChangeAspect="1"/>
+            </p:cNvPicPr>
+            <p:nvPr/>
+          </p:nvPicPr>
+          <p:blipFill>
+            <a:blip r:embed="rId2"/>
+            <a:stretch>
+              <a:fillRect/>
+            </a:stretch>
+          </p:blipFill>
+          <p:spPr>
+            <a:xfrm>
+              <a:off x="2819607" y="841680"/>
+              <a:ext cx="1094780" cy="1094781"/>
+            </a:xfrm>
+            <a:prstGeom prst="rect">
+              <a:avLst/>
+            </a:prstGeom>
+          </p:spPr>
+        </p:pic>
+        <p:sp>
+          <p:nvSpPr>
+            <p:cNvPr id="26" name="Rectangle 25">
+              <a:extLst>
+                <a:ext uri="{FF2B5EF4-FFF2-40B4-BE49-F238E27FC236}">
+                  <a16:creationId xmlns:a16="http://schemas.microsoft.com/office/drawing/2014/main" id="{619B246F-F6EF-2739-0973-FFBBB0D0FFEF}"/>
+                </a:ext>
+              </a:extLst>
+            </p:cNvPr>
+            <p:cNvSpPr/>
+            <p:nvPr/>
+          </p:nvSpPr>
+          <p:spPr>
+            <a:xfrm>
+              <a:off x="2819605" y="234520"/>
+              <a:ext cx="6552783" cy="607309"/>
+            </a:xfrm>
+            <a:prstGeom prst="rect">
+              <a:avLst/>
+            </a:prstGeom>
+            <a:solidFill>
+              <a:srgbClr val="0D3E51"/>
+            </a:solidFill>
+            <a:ln>
+              <a:noFill/>
+            </a:ln>
+          </p:spPr>
+          <p:style>
+            <a:lnRef idx="2">
+              <a:schemeClr val="accent1">
+                <a:shade val="15000"/>
+              </a:schemeClr>
+            </a:lnRef>
+            <a:fillRef idx="1">
+              <a:schemeClr val="accent1"/>
+            </a:fillRef>
+            <a:effectRef idx="0">
+              <a:schemeClr val="accent1"/>
+            </a:effectRef>
+            <a:fontRef idx="minor">
+              <a:schemeClr val="lt1"/>
+            </a:fontRef>
+          </p:style>
+          <p:txBody>
+            <a:bodyPr rtlCol="0" anchor="ctr"/>
+            <a:lstStyle/>
+            <a:p>
+              <a:pPr algn="ctr"/>
+              <a:endParaRPr lang="en-IN"/>
+            </a:p>
+          </p:txBody>
+        </p:sp>
+        <p:sp>
+          <p:nvSpPr>
+            <p:cNvPr id="27" name="Rectangle 26">
+              <a:extLst>
+                <a:ext uri="{FF2B5EF4-FFF2-40B4-BE49-F238E27FC236}">
+                  <a16:creationId xmlns:a16="http://schemas.microsoft.com/office/drawing/2014/main" id="{E0840FEA-4121-A11F-D6A5-FA90350EA3F5}"/>
+                </a:ext>
+              </a:extLst>
+            </p:cNvPr>
+            <p:cNvSpPr>
+              <a:spLocks noChangeAspect="1"/>
+            </p:cNvSpPr>
+            <p:nvPr/>
+          </p:nvSpPr>
+          <p:spPr>
+            <a:xfrm>
+              <a:off x="3914386" y="841829"/>
+              <a:ext cx="5458002" cy="1094632"/>
+            </a:xfrm>
+            <a:prstGeom prst="rect">
+              <a:avLst/>
+            </a:prstGeom>
+            <a:solidFill>
+              <a:srgbClr val="5B7C99"/>
+            </a:solidFill>
+            <a:ln w="28575">
+              <a:noFill/>
+            </a:ln>
+          </p:spPr>
+          <p:style>
+            <a:lnRef idx="2">
+              <a:schemeClr val="accent1">
+                <a:shade val="15000"/>
+              </a:schemeClr>
+            </a:lnRef>
+            <a:fillRef idx="1">
+              <a:schemeClr val="accent1"/>
+            </a:fillRef>
+            <a:effectRef idx="0">
+              <a:schemeClr val="accent1"/>
+            </a:effectRef>
+            <a:fontRef idx="minor">
+              <a:schemeClr val="lt1"/>
+            </a:fontRef>
+          </p:style>
+          <p:txBody>
+            <a:bodyPr rtlCol="0" anchor="ctr"/>
+            <a:lstStyle/>
+            <a:p>
+              <a:pPr algn="ctr"/>
+              <a:endParaRPr lang="en-IN" dirty="0"/>
+            </a:p>
+          </p:txBody>
+        </p:sp>
+        <p:sp>
+          <p:nvSpPr>
+            <p:cNvPr id="28" name="TextBox 27">
+              <a:extLst>
+                <a:ext uri="{FF2B5EF4-FFF2-40B4-BE49-F238E27FC236}">
+                  <a16:creationId xmlns:a16="http://schemas.microsoft.com/office/drawing/2014/main" id="{C0562E71-86DB-290E-5EF3-7E442B71E32F}"/>
+                </a:ext>
+              </a:extLst>
+            </p:cNvPr>
+            <p:cNvSpPr txBox="1"/>
+            <p:nvPr/>
+          </p:nvSpPr>
+          <p:spPr>
+            <a:xfrm>
+              <a:off x="3914386" y="838811"/>
+              <a:ext cx="5458002" cy="923330"/>
+            </a:xfrm>
+            <a:prstGeom prst="rect">
+              <a:avLst/>
+            </a:prstGeom>
+            <a:noFill/>
+          </p:spPr>
+          <p:txBody>
+            <a:bodyPr wrap="square" rtlCol="0">
+              <a:spAutoFit/>
+            </a:bodyPr>
+            <a:lstStyle/>
+            <a:p>
+              <a:pPr algn="ctr"/>
+              <a:r>
+                <a:rPr lang="en-US" sz="5400" dirty="0" err="1">
+                  <a:solidFill>
+                    <a:srgbClr val="EEF4ED"/>
+                  </a:solidFill>
+                  <a:latin typeface="Rockwell Extra Bold" panose="02060903040505020403" pitchFamily="18" charset="0"/>
+                </a:rPr>
+                <a:t>tek</a:t>
+              </a:r>
+              <a:r>
+                <a:rPr lang="en-US" sz="5400" dirty="0" err="1">
+                  <a:solidFill>
+                    <a:srgbClr val="EEF4ED"/>
+                  </a:solidFill>
+                  <a:latin typeface="Rockwell" panose="02060603020205020403" pitchFamily="18" charset="0"/>
+                </a:rPr>
+                <a:t>Medika</a:t>
+              </a:r>
+              <a:endParaRPr lang="en-IN" sz="4800" dirty="0">
+                <a:solidFill>
+                  <a:srgbClr val="EEF4ED"/>
+                </a:solidFill>
+                <a:latin typeface="Rockwell" panose="02060603020205020403" pitchFamily="18" charset="0"/>
+              </a:endParaRPr>
+            </a:p>
+          </p:txBody>
+        </p:sp>
+        <p:sp>
+          <p:nvSpPr>
+            <p:cNvPr id="29" name="TextBox 28">
+              <a:extLst>
+                <a:ext uri="{FF2B5EF4-FFF2-40B4-BE49-F238E27FC236}">
+                  <a16:creationId xmlns:a16="http://schemas.microsoft.com/office/drawing/2014/main" id="{90721170-51D0-FEC8-4ED8-60E134103EF2}"/>
+                </a:ext>
+              </a:extLst>
+            </p:cNvPr>
+            <p:cNvSpPr txBox="1"/>
+            <p:nvPr/>
+          </p:nvSpPr>
+          <p:spPr>
+            <a:xfrm>
+              <a:off x="2819604" y="130925"/>
+              <a:ext cx="6552781" cy="707886"/>
+            </a:xfrm>
+            <a:prstGeom prst="rect">
+              <a:avLst/>
+            </a:prstGeom>
+            <a:solidFill>
+              <a:srgbClr val="2C94BC"/>
+            </a:solidFill>
+            <a:ln w="28575">
+              <a:noFill/>
+            </a:ln>
+          </p:spPr>
+          <p:txBody>
+            <a:bodyPr wrap="square" rtlCol="0">
+              <a:spAutoFit/>
+            </a:bodyPr>
+            <a:lstStyle/>
+            <a:p>
+              <a:pPr algn="ctr"/>
+              <a:r>
+                <a:rPr lang="en-US" sz="4000" b="1" dirty="0">
+                  <a:solidFill>
+                    <a:srgbClr val="EEF4ED"/>
+                  </a:solidFill>
+                  <a:latin typeface="Cera Pro Medium" panose="00000600000000000000" pitchFamily="50" charset="0"/>
+                </a:rPr>
+                <a:t>INSPIRE-100    </a:t>
+              </a:r>
+              <a:r>
+                <a:rPr lang="en-US" sz="4000" i="1" dirty="0">
+                  <a:solidFill>
+                    <a:srgbClr val="EEF4ED"/>
+                  </a:solidFill>
+                  <a:latin typeface="Cera Pro Medium" panose="00000600000000000000" pitchFamily="50" charset="0"/>
+                </a:rPr>
+                <a:t>FiO2 Calculator</a:t>
+              </a:r>
+              <a:endParaRPr lang="en-IN" sz="4000" i="1" dirty="0">
+                <a:solidFill>
+                  <a:srgbClr val="EEF4ED"/>
+                </a:solidFill>
+                <a:latin typeface="Cera Pro Medium" panose="00000600000000000000" pitchFamily="50" charset="0"/>
+              </a:endParaRPr>
+            </a:p>
+          </p:txBody>
+        </p:sp>
+      </p:grpSp>
+      <p:grpSp>
+        <p:nvGrpSpPr>
+          <p:cNvPr id="36" name="Group 35">
+            <a:extLst>
+              <a:ext uri="{FF2B5EF4-FFF2-40B4-BE49-F238E27FC236}">
+                <a16:creationId xmlns:a16="http://schemas.microsoft.com/office/drawing/2014/main" id="{FB673BEE-D7A9-9199-714A-7D9E38A28D90}"/>
+              </a:ext>
+            </a:extLst>
+          </p:cNvPr>
+          <p:cNvGrpSpPr/>
+          <p:nvPr/>
+        </p:nvGrpSpPr>
+        <p:grpSpPr>
+          <a:xfrm>
+            <a:off x="2819605" y="3115054"/>
+            <a:ext cx="6552784" cy="1805536"/>
+            <a:chOff x="2819604" y="130925"/>
+            <a:chExt cx="6552784" cy="1805536"/>
+          </a:xfrm>
+        </p:grpSpPr>
+        <p:pic>
+          <p:nvPicPr>
+            <p:cNvPr id="37" name="Picture 36">
+              <a:extLst>
+                <a:ext uri="{FF2B5EF4-FFF2-40B4-BE49-F238E27FC236}">
+                  <a16:creationId xmlns:a16="http://schemas.microsoft.com/office/drawing/2014/main" id="{9CD38CCC-C875-0E24-B0B4-9D468B7FB530}"/>
+                </a:ext>
+              </a:extLst>
+            </p:cNvPr>
+            <p:cNvPicPr>
+              <a:picLocks noChangeAspect="1"/>
+            </p:cNvPicPr>
+            <p:nvPr/>
+          </p:nvPicPr>
+          <p:blipFill>
+            <a:blip r:embed="rId2"/>
+            <a:stretch>
+              <a:fillRect/>
+            </a:stretch>
+          </p:blipFill>
+          <p:spPr>
+            <a:xfrm>
+              <a:off x="2819607" y="841680"/>
+              <a:ext cx="1094780" cy="1094781"/>
+            </a:xfrm>
+            <a:prstGeom prst="rect">
+              <a:avLst/>
+            </a:prstGeom>
+          </p:spPr>
+        </p:pic>
+        <p:sp>
+          <p:nvSpPr>
+            <p:cNvPr id="38" name="Rectangle 37">
+              <a:extLst>
+                <a:ext uri="{FF2B5EF4-FFF2-40B4-BE49-F238E27FC236}">
+                  <a16:creationId xmlns:a16="http://schemas.microsoft.com/office/drawing/2014/main" id="{8C8D13D5-5C71-5CEB-C8C7-C492486FB542}"/>
+                </a:ext>
+              </a:extLst>
+            </p:cNvPr>
+            <p:cNvSpPr/>
+            <p:nvPr/>
+          </p:nvSpPr>
+          <p:spPr>
+            <a:xfrm>
+              <a:off x="2819605" y="234520"/>
+              <a:ext cx="6552783" cy="607309"/>
+            </a:xfrm>
+            <a:prstGeom prst="rect">
+              <a:avLst/>
+            </a:prstGeom>
+            <a:solidFill>
+              <a:srgbClr val="0D3E51"/>
+            </a:solidFill>
+            <a:ln>
+              <a:noFill/>
+            </a:ln>
+          </p:spPr>
+          <p:style>
+            <a:lnRef idx="2">
+              <a:schemeClr val="accent1">
+                <a:shade val="15000"/>
+              </a:schemeClr>
+            </a:lnRef>
+            <a:fillRef idx="1">
+              <a:schemeClr val="accent1"/>
+            </a:fillRef>
+            <a:effectRef idx="0">
+              <a:schemeClr val="accent1"/>
+            </a:effectRef>
+            <a:fontRef idx="minor">
+              <a:schemeClr val="lt1"/>
+            </a:fontRef>
+          </p:style>
+          <p:txBody>
+            <a:bodyPr rtlCol="0" anchor="ctr"/>
+            <a:lstStyle/>
+            <a:p>
+              <a:pPr algn="ctr"/>
+              <a:endParaRPr lang="en-IN"/>
+            </a:p>
+          </p:txBody>
+        </p:sp>
+        <p:sp>
+          <p:nvSpPr>
+            <p:cNvPr id="39" name="Rectangle 38">
+              <a:extLst>
+                <a:ext uri="{FF2B5EF4-FFF2-40B4-BE49-F238E27FC236}">
+                  <a16:creationId xmlns:a16="http://schemas.microsoft.com/office/drawing/2014/main" id="{3AF023FF-6FEF-2AD1-3CED-6DA857D519E9}"/>
+                </a:ext>
+              </a:extLst>
+            </p:cNvPr>
+            <p:cNvSpPr>
+              <a:spLocks noChangeAspect="1"/>
+            </p:cNvSpPr>
+            <p:nvPr/>
+          </p:nvSpPr>
+          <p:spPr>
+            <a:xfrm>
+              <a:off x="3914386" y="841829"/>
+              <a:ext cx="5458002" cy="1094632"/>
+            </a:xfrm>
+            <a:prstGeom prst="rect">
+              <a:avLst/>
+            </a:prstGeom>
+            <a:solidFill>
+              <a:srgbClr val="5B7C99"/>
+            </a:solidFill>
+            <a:ln w="28575">
+              <a:noFill/>
+            </a:ln>
+          </p:spPr>
+          <p:style>
+            <a:lnRef idx="2">
+              <a:schemeClr val="accent1">
+                <a:shade val="15000"/>
+              </a:schemeClr>
+            </a:lnRef>
+            <a:fillRef idx="1">
+              <a:schemeClr val="accent1"/>
+            </a:fillRef>
+            <a:effectRef idx="0">
+              <a:schemeClr val="accent1"/>
+            </a:effectRef>
+            <a:fontRef idx="minor">
+              <a:schemeClr val="lt1"/>
+            </a:fontRef>
+          </p:style>
+          <p:txBody>
+            <a:bodyPr rtlCol="0" anchor="ctr"/>
+            <a:lstStyle/>
+            <a:p>
+              <a:pPr algn="ctr"/>
+              <a:endParaRPr lang="en-IN" dirty="0"/>
+            </a:p>
+          </p:txBody>
+        </p:sp>
+        <p:sp>
+          <p:nvSpPr>
+            <p:cNvPr id="40" name="TextBox 39">
+              <a:extLst>
+                <a:ext uri="{FF2B5EF4-FFF2-40B4-BE49-F238E27FC236}">
+                  <a16:creationId xmlns:a16="http://schemas.microsoft.com/office/drawing/2014/main" id="{CE2B2EB7-7595-9D13-E347-0795E2EEC125}"/>
+                </a:ext>
+              </a:extLst>
+            </p:cNvPr>
+            <p:cNvSpPr txBox="1"/>
+            <p:nvPr/>
+          </p:nvSpPr>
+          <p:spPr>
+            <a:xfrm>
+              <a:off x="3914386" y="838811"/>
+              <a:ext cx="5458002" cy="923330"/>
+            </a:xfrm>
+            <a:prstGeom prst="rect">
+              <a:avLst/>
+            </a:prstGeom>
+            <a:noFill/>
+          </p:spPr>
+          <p:txBody>
+            <a:bodyPr wrap="square" rtlCol="0">
+              <a:spAutoFit/>
+            </a:bodyPr>
+            <a:lstStyle/>
+            <a:p>
+              <a:pPr algn="ctr"/>
+              <a:r>
+                <a:rPr lang="en-US" sz="5400" dirty="0" err="1">
+                  <a:solidFill>
+                    <a:srgbClr val="EEF4ED"/>
+                  </a:solidFill>
+                  <a:latin typeface="Rockwell Extra Bold" panose="02060903040505020403" pitchFamily="18" charset="0"/>
+                </a:rPr>
+                <a:t>tek</a:t>
+              </a:r>
+              <a:r>
+                <a:rPr lang="en-US" sz="5400" dirty="0" err="1">
+                  <a:solidFill>
+                    <a:srgbClr val="EEF4ED"/>
+                  </a:solidFill>
+                  <a:latin typeface="Rockwell" panose="02060603020205020403" pitchFamily="18" charset="0"/>
+                </a:rPr>
+                <a:t>Medika</a:t>
+              </a:r>
+              <a:endParaRPr lang="en-IN" sz="4800" dirty="0">
+                <a:solidFill>
+                  <a:srgbClr val="EEF4ED"/>
+                </a:solidFill>
+                <a:latin typeface="Rockwell" panose="02060603020205020403" pitchFamily="18" charset="0"/>
+              </a:endParaRPr>
+            </a:p>
+          </p:txBody>
+        </p:sp>
+        <p:sp>
+          <p:nvSpPr>
+            <p:cNvPr id="41" name="TextBox 40">
+              <a:extLst>
+                <a:ext uri="{FF2B5EF4-FFF2-40B4-BE49-F238E27FC236}">
+                  <a16:creationId xmlns:a16="http://schemas.microsoft.com/office/drawing/2014/main" id="{83CB3C2F-8192-46A5-37FF-7CA30DBED553}"/>
+                </a:ext>
+              </a:extLst>
+            </p:cNvPr>
+            <p:cNvSpPr txBox="1"/>
+            <p:nvPr/>
+          </p:nvSpPr>
+          <p:spPr>
+            <a:xfrm>
+              <a:off x="2819604" y="130925"/>
+              <a:ext cx="6552781" cy="707886"/>
+            </a:xfrm>
+            <a:prstGeom prst="rect">
+              <a:avLst/>
+            </a:prstGeom>
+            <a:solidFill>
+              <a:srgbClr val="2C94BC"/>
+            </a:solidFill>
+            <a:ln w="28575">
+              <a:noFill/>
+            </a:ln>
+          </p:spPr>
+          <p:txBody>
+            <a:bodyPr wrap="square" rtlCol="0">
+              <a:spAutoFit/>
+            </a:bodyPr>
+            <a:lstStyle/>
+            <a:p>
+              <a:pPr algn="ctr"/>
+              <a:r>
+                <a:rPr lang="en-US" sz="4000" b="1" dirty="0">
+                  <a:solidFill>
+                    <a:srgbClr val="EEF4ED"/>
+                  </a:solidFill>
+                  <a:latin typeface="Cera Pro Medium" panose="00000600000000000000" pitchFamily="50" charset="0"/>
+                </a:rPr>
+                <a:t>INSPIRE-100    </a:t>
+              </a:r>
+              <a:r>
+                <a:rPr lang="en-US" sz="4000" i="1" dirty="0">
+                  <a:solidFill>
+                    <a:srgbClr val="EEF4ED"/>
+                  </a:solidFill>
+                  <a:latin typeface="Cera Pro Medium" panose="00000600000000000000" pitchFamily="50" charset="0"/>
+                </a:rPr>
+                <a:t>PSV Calculator</a:t>
+              </a:r>
+              <a:endParaRPr lang="en-IN" sz="4000" i="1" dirty="0">
+                <a:solidFill>
+                  <a:srgbClr val="EEF4ED"/>
+                </a:solidFill>
+                <a:latin typeface="Cera Pro Medium" panose="00000600000000000000" pitchFamily="50" charset="0"/>
+              </a:endParaRPr>
+            </a:p>
+          </p:txBody>
+        </p:sp>
+      </p:grpSp>
+    </p:spTree>
+    <p:extLst>
+      <p:ext uri="{BB962C8B-B14F-4D97-AF65-F5344CB8AC3E}">
+        <p14:creationId xmlns:p14="http://schemas.microsoft.com/office/powerpoint/2010/main" val="917225869"/>
+      </p:ext>
+    </p:extLst>
+  </p:cSld>
+  <p:clrMapOvr>
+    <a:masterClrMapping/>
+  </p:clrMapOvr>
+</p:sld>
+</file>
+
+<file path=ppt/slides/slide3.xml><?xml version="1.0" encoding="utf-8"?>
+<p:sld xmlns:a="http://schemas.openxmlformats.org/drawingml/2006/main" xmlns:r="http://schemas.openxmlformats.org/officeDocument/2006/relationships" xmlns:p="http://schemas.openxmlformats.org/presentationml/2006/main">
+  <p:cSld>
+    <p:spTree>
+      <p:nvGrpSpPr>
+        <p:cNvPr id="1" name=""/>
+        <p:cNvGrpSpPr/>
+        <p:nvPr/>
+      </p:nvGrpSpPr>
+      <p:grpSpPr>
+        <a:xfrm>
+          <a:off x="0" y="0"/>
+          <a:ext cx="0" cy="0"/>
+          <a:chOff x="0" y="0"/>
+          <a:chExt cx="0" cy="0"/>
+        </a:xfrm>
+      </p:grpSpPr>
+      <p:grpSp>
+        <p:nvGrpSpPr>
+          <p:cNvPr id="14" name="Group 13">
+            <a:extLst>
+              <a:ext uri="{FF2B5EF4-FFF2-40B4-BE49-F238E27FC236}">
+                <a16:creationId xmlns:a16="http://schemas.microsoft.com/office/drawing/2014/main" id="{C9A23F50-900A-0715-A32B-6572F034A7CE}"/>
+              </a:ext>
+            </a:extLst>
+          </p:cNvPr>
+          <p:cNvGrpSpPr/>
+          <p:nvPr/>
+        </p:nvGrpSpPr>
+        <p:grpSpPr>
+          <a:xfrm>
+            <a:off x="2001588" y="830846"/>
+            <a:ext cx="8188824" cy="1477301"/>
+            <a:chOff x="406536" y="3152015"/>
+            <a:chExt cx="8188824" cy="1477301"/>
+          </a:xfrm>
+        </p:grpSpPr>
+        <p:sp>
+          <p:nvSpPr>
+            <p:cNvPr id="6" name="Rectangle 5">
+              <a:extLst>
+                <a:ext uri="{FF2B5EF4-FFF2-40B4-BE49-F238E27FC236}">
+                  <a16:creationId xmlns:a16="http://schemas.microsoft.com/office/drawing/2014/main" id="{1B340D44-C497-4210-6562-F644969F9AAF}"/>
+                </a:ext>
+              </a:extLst>
+            </p:cNvPr>
+            <p:cNvSpPr>
+              <a:spLocks noChangeAspect="1"/>
+            </p:cNvSpPr>
+            <p:nvPr/>
+          </p:nvSpPr>
+          <p:spPr>
+            <a:xfrm>
+              <a:off x="406536" y="3152015"/>
+              <a:ext cx="2540895" cy="1477301"/>
+            </a:xfrm>
+            <a:prstGeom prst="rect">
+              <a:avLst/>
+            </a:prstGeom>
+            <a:solidFill>
+              <a:srgbClr val="2C94BC"/>
+            </a:solidFill>
+            <a:ln w="28575">
+              <a:noFill/>
+            </a:ln>
+          </p:spPr>
+          <p:style>
+            <a:lnRef idx="2">
+              <a:schemeClr val="accent1">
+                <a:shade val="15000"/>
+              </a:schemeClr>
+            </a:lnRef>
+            <a:fillRef idx="1">
+              <a:schemeClr val="accent1"/>
+            </a:fillRef>
+            <a:effectRef idx="0">
+              <a:schemeClr val="accent1"/>
+            </a:effectRef>
+            <a:fontRef idx="minor">
+              <a:schemeClr val="lt1"/>
+            </a:fontRef>
+          </p:style>
+          <p:txBody>
+            <a:bodyPr rtlCol="0" anchor="ctr"/>
+            <a:lstStyle/>
+            <a:p>
+              <a:pPr algn="ctr"/>
+              <a:r>
+                <a:rPr lang="en-US" sz="3200" b="1" dirty="0">
+                  <a:solidFill>
+                    <a:srgbClr val="EEF4ED"/>
+                  </a:solidFill>
+                </a:rPr>
+                <a:t>INSPIRE-100</a:t>
+              </a:r>
+            </a:p>
+            <a:p>
+              <a:pPr algn="ctr"/>
+              <a:r>
+                <a:rPr lang="en-US" sz="3600" i="1" dirty="0">
+                  <a:solidFill>
+                    <a:srgbClr val="EEF4ED"/>
+                  </a:solidFill>
+                </a:rPr>
+                <a:t>Dashboard</a:t>
+              </a:r>
+              <a:endParaRPr lang="en-IN" sz="3200" i="1" dirty="0">
+                <a:solidFill>
+                  <a:srgbClr val="EEF4ED"/>
+                </a:solidFill>
+              </a:endParaRPr>
+            </a:p>
+          </p:txBody>
+        </p:sp>
+        <p:grpSp>
+          <p:nvGrpSpPr>
+            <p:cNvPr id="13" name="Group 12">
+              <a:extLst>
+                <a:ext uri="{FF2B5EF4-FFF2-40B4-BE49-F238E27FC236}">
+                  <a16:creationId xmlns:a16="http://schemas.microsoft.com/office/drawing/2014/main" id="{28553205-E229-C2B7-1F93-00F91BA9A5E3}"/>
+                </a:ext>
+              </a:extLst>
+            </p:cNvPr>
+            <p:cNvGrpSpPr>
+              <a:grpSpLocks noChangeAspect="1"/>
+            </p:cNvGrpSpPr>
+            <p:nvPr/>
+          </p:nvGrpSpPr>
+          <p:grpSpPr>
+            <a:xfrm>
+              <a:off x="2947431" y="3152015"/>
+              <a:ext cx="5647929" cy="1473440"/>
+              <a:chOff x="2819611" y="3567393"/>
+              <a:chExt cx="4196470" cy="1094781"/>
+            </a:xfrm>
+          </p:grpSpPr>
+          <p:pic>
+            <p:nvPicPr>
+              <p:cNvPr id="8" name="Picture 7">
+                <a:extLst>
+                  <a:ext uri="{FF2B5EF4-FFF2-40B4-BE49-F238E27FC236}">
+                    <a16:creationId xmlns:a16="http://schemas.microsoft.com/office/drawing/2014/main" id="{9D990066-B59D-C34C-5DB7-02B7BBA50CB8}"/>
+                  </a:ext>
+                </a:extLst>
+              </p:cNvPr>
+              <p:cNvPicPr>
+                <a:picLocks noChangeAspect="1"/>
+              </p:cNvPicPr>
+              <p:nvPr/>
+            </p:nvPicPr>
+            <p:blipFill>
+              <a:blip r:embed="rId2"/>
+              <a:stretch>
+                <a:fillRect/>
+              </a:stretch>
+            </p:blipFill>
+            <p:spPr>
+              <a:xfrm>
+                <a:off x="2819611" y="3567393"/>
+                <a:ext cx="1094780" cy="1094781"/>
+              </a:xfrm>
+              <a:prstGeom prst="rect">
+                <a:avLst/>
+              </a:prstGeom>
+            </p:spPr>
+          </p:pic>
+          <p:sp>
+            <p:nvSpPr>
+              <p:cNvPr id="10" name="Rectangle 9">
+                <a:extLst>
+                  <a:ext uri="{FF2B5EF4-FFF2-40B4-BE49-F238E27FC236}">
+                    <a16:creationId xmlns:a16="http://schemas.microsoft.com/office/drawing/2014/main" id="{81D739AE-DEDB-E70E-42A6-4F714693FFF9}"/>
+                  </a:ext>
+                </a:extLst>
+              </p:cNvPr>
+              <p:cNvSpPr>
+                <a:spLocks noChangeAspect="1"/>
+              </p:cNvSpPr>
+              <p:nvPr/>
+            </p:nvSpPr>
+            <p:spPr>
+              <a:xfrm>
+                <a:off x="3914390" y="3567542"/>
+                <a:ext cx="3101691" cy="1094632"/>
+              </a:xfrm>
+              <a:prstGeom prst="rect">
+                <a:avLst/>
+              </a:prstGeom>
+              <a:solidFill>
+                <a:srgbClr val="5B7C99"/>
+              </a:solidFill>
+              <a:ln w="28575">
+                <a:noFill/>
+              </a:ln>
+            </p:spPr>
+            <p:style>
+              <a:lnRef idx="2">
+                <a:schemeClr val="accent1">
+                  <a:shade val="15000"/>
+                </a:schemeClr>
+              </a:lnRef>
+              <a:fillRef idx="1">
+                <a:schemeClr val="accent1"/>
+              </a:fillRef>
+              <a:effectRef idx="0">
+                <a:schemeClr val="accent1"/>
+              </a:effectRef>
+              <a:fontRef idx="minor">
+                <a:schemeClr val="lt1"/>
+              </a:fontRef>
+            </p:style>
+            <p:txBody>
+              <a:bodyPr rtlCol="0" anchor="ctr"/>
+              <a:lstStyle/>
+              <a:p>
+                <a:pPr algn="ctr"/>
+                <a:endParaRPr lang="en-IN" dirty="0"/>
+              </a:p>
+            </p:txBody>
+          </p:sp>
+          <p:sp>
+            <p:nvSpPr>
+              <p:cNvPr id="11" name="TextBox 10">
+                <a:extLst>
+                  <a:ext uri="{FF2B5EF4-FFF2-40B4-BE49-F238E27FC236}">
+                    <a16:creationId xmlns:a16="http://schemas.microsoft.com/office/drawing/2014/main" id="{408BEBA6-E9B7-9BE4-86F4-F61B7B926391}"/>
+                  </a:ext>
+                </a:extLst>
+              </p:cNvPr>
+              <p:cNvSpPr txBox="1"/>
+              <p:nvPr/>
+            </p:nvSpPr>
+            <p:spPr>
+              <a:xfrm>
+                <a:off x="3914390" y="3745913"/>
+                <a:ext cx="3028524" cy="686044"/>
+              </a:xfrm>
+              <a:prstGeom prst="rect">
+                <a:avLst/>
+              </a:prstGeom>
+              <a:noFill/>
+            </p:spPr>
+            <p:txBody>
+              <a:bodyPr wrap="square" rtlCol="0">
+                <a:spAutoFit/>
+              </a:bodyPr>
+              <a:lstStyle/>
+              <a:p>
+                <a:pPr algn="ctr"/>
+                <a:r>
+                  <a:rPr lang="en-US" sz="5400" dirty="0" err="1">
+                    <a:solidFill>
+                      <a:srgbClr val="EEF4ED"/>
+                    </a:solidFill>
+                    <a:latin typeface="Rockwell Extra Bold" panose="02060903040505020403" pitchFamily="18" charset="0"/>
+                  </a:rPr>
+                  <a:t>tek</a:t>
+                </a:r>
+                <a:r>
+                  <a:rPr lang="en-US" sz="5400" dirty="0" err="1">
+                    <a:solidFill>
+                      <a:srgbClr val="EEF4ED"/>
+                    </a:solidFill>
+                    <a:latin typeface="Rockwell" panose="02060603020205020403" pitchFamily="18" charset="0"/>
+                  </a:rPr>
+                  <a:t>Medika</a:t>
+                </a:r>
+                <a:endParaRPr lang="en-IN" sz="4800" dirty="0">
+                  <a:solidFill>
+                    <a:srgbClr val="EEF4ED"/>
+                  </a:solidFill>
+                  <a:latin typeface="Rockwell" panose="02060603020205020403" pitchFamily="18" charset="0"/>
+                </a:endParaRPr>
+              </a:p>
+            </p:txBody>
+          </p:sp>
+        </p:grpSp>
+      </p:grpSp>
+      <p:grpSp>
+        <p:nvGrpSpPr>
+          <p:cNvPr id="20" name="Group 19">
+            <a:extLst>
+              <a:ext uri="{FF2B5EF4-FFF2-40B4-BE49-F238E27FC236}">
+                <a16:creationId xmlns:a16="http://schemas.microsoft.com/office/drawing/2014/main" id="{41D144CF-D8DA-3657-D3D2-DFFF71FB4BAB}"/>
+              </a:ext>
+            </a:extLst>
+          </p:cNvPr>
+          <p:cNvGrpSpPr/>
+          <p:nvPr/>
+        </p:nvGrpSpPr>
+        <p:grpSpPr>
+          <a:xfrm>
+            <a:off x="2001588" y="2826114"/>
+            <a:ext cx="8188824" cy="1477301"/>
+            <a:chOff x="406536" y="3152015"/>
+            <a:chExt cx="8188824" cy="1477301"/>
+          </a:xfrm>
+        </p:grpSpPr>
+        <p:sp>
+          <p:nvSpPr>
+            <p:cNvPr id="21" name="Rectangle 20">
+              <a:extLst>
+                <a:ext uri="{FF2B5EF4-FFF2-40B4-BE49-F238E27FC236}">
+                  <a16:creationId xmlns:a16="http://schemas.microsoft.com/office/drawing/2014/main" id="{9B07B337-D4A6-D294-E685-0E5F954E4C35}"/>
+                </a:ext>
+              </a:extLst>
+            </p:cNvPr>
+            <p:cNvSpPr>
+              <a:spLocks noChangeAspect="1"/>
+            </p:cNvSpPr>
+            <p:nvPr/>
+          </p:nvSpPr>
+          <p:spPr>
+            <a:xfrm>
+              <a:off x="406536" y="3152015"/>
+              <a:ext cx="2540895" cy="1477301"/>
+            </a:xfrm>
+            <a:prstGeom prst="rect">
+              <a:avLst/>
+            </a:prstGeom>
+            <a:solidFill>
+              <a:srgbClr val="2C94BC"/>
+            </a:solidFill>
+            <a:ln w="28575">
+              <a:noFill/>
+            </a:ln>
+          </p:spPr>
+          <p:style>
+            <a:lnRef idx="2">
+              <a:schemeClr val="accent1">
+                <a:shade val="15000"/>
+              </a:schemeClr>
+            </a:lnRef>
+            <a:fillRef idx="1">
+              <a:schemeClr val="accent1"/>
+            </a:fillRef>
+            <a:effectRef idx="0">
+              <a:schemeClr val="accent1"/>
+            </a:effectRef>
+            <a:fontRef idx="minor">
+              <a:schemeClr val="lt1"/>
+            </a:fontRef>
+          </p:style>
+          <p:txBody>
+            <a:bodyPr rtlCol="0" anchor="ctr"/>
+            <a:lstStyle/>
+            <a:p>
+              <a:pPr algn="ctr"/>
+              <a:r>
+                <a:rPr lang="en-US" sz="3200" b="1" dirty="0">
+                  <a:solidFill>
+                    <a:srgbClr val="EEF4ED"/>
+                  </a:solidFill>
+                </a:rPr>
+                <a:t>INSPIRE-100</a:t>
+              </a:r>
+            </a:p>
+            <a:p>
+              <a:pPr algn="ctr"/>
+              <a:r>
+                <a:rPr lang="en-US" sz="3600" i="1" dirty="0">
+                  <a:solidFill>
+                    <a:srgbClr val="EEF4ED"/>
+                  </a:solidFill>
+                </a:rPr>
+                <a:t>Analyzer</a:t>
+              </a:r>
+              <a:endParaRPr lang="en-IN" sz="3200" i="1" dirty="0">
+                <a:solidFill>
+                  <a:srgbClr val="EEF4ED"/>
+                </a:solidFill>
+              </a:endParaRPr>
+            </a:p>
+          </p:txBody>
+        </p:sp>
+        <p:grpSp>
+          <p:nvGrpSpPr>
+            <p:cNvPr id="22" name="Group 21">
+              <a:extLst>
+                <a:ext uri="{FF2B5EF4-FFF2-40B4-BE49-F238E27FC236}">
+                  <a16:creationId xmlns:a16="http://schemas.microsoft.com/office/drawing/2014/main" id="{6256B338-745C-3100-A0F7-6C7A7AF92E74}"/>
+                </a:ext>
+              </a:extLst>
+            </p:cNvPr>
+            <p:cNvGrpSpPr>
+              <a:grpSpLocks noChangeAspect="1"/>
+            </p:cNvGrpSpPr>
+            <p:nvPr/>
+          </p:nvGrpSpPr>
+          <p:grpSpPr>
+            <a:xfrm>
+              <a:off x="2947431" y="3152015"/>
+              <a:ext cx="5647929" cy="1473440"/>
+              <a:chOff x="2819611" y="3567393"/>
+              <a:chExt cx="4196470" cy="1094781"/>
+            </a:xfrm>
+          </p:grpSpPr>
+          <p:pic>
+            <p:nvPicPr>
+              <p:cNvPr id="23" name="Picture 22">
+                <a:extLst>
+                  <a:ext uri="{FF2B5EF4-FFF2-40B4-BE49-F238E27FC236}">
+                    <a16:creationId xmlns:a16="http://schemas.microsoft.com/office/drawing/2014/main" id="{DA656AB7-1FB1-A2BB-7E40-CCC03E24BB90}"/>
+                  </a:ext>
+                </a:extLst>
+              </p:cNvPr>
+              <p:cNvPicPr>
+                <a:picLocks noChangeAspect="1"/>
+              </p:cNvPicPr>
+              <p:nvPr/>
+            </p:nvPicPr>
+            <p:blipFill>
+              <a:blip r:embed="rId2"/>
+              <a:stretch>
+                <a:fillRect/>
+              </a:stretch>
+            </p:blipFill>
+            <p:spPr>
+              <a:xfrm>
+                <a:off x="2819611" y="3567393"/>
+                <a:ext cx="1094780" cy="1094781"/>
+              </a:xfrm>
+              <a:prstGeom prst="rect">
+                <a:avLst/>
+              </a:prstGeom>
+            </p:spPr>
+          </p:pic>
+          <p:sp>
+            <p:nvSpPr>
+              <p:cNvPr id="24" name="Rectangle 23">
+                <a:extLst>
+                  <a:ext uri="{FF2B5EF4-FFF2-40B4-BE49-F238E27FC236}">
+                    <a16:creationId xmlns:a16="http://schemas.microsoft.com/office/drawing/2014/main" id="{3A3B4266-F563-B7B1-7E55-3502E06A587D}"/>
+                  </a:ext>
+                </a:extLst>
+              </p:cNvPr>
+              <p:cNvSpPr>
+                <a:spLocks noChangeAspect="1"/>
+              </p:cNvSpPr>
+              <p:nvPr/>
+            </p:nvSpPr>
+            <p:spPr>
+              <a:xfrm>
+                <a:off x="3914390" y="3567542"/>
+                <a:ext cx="3101691" cy="1094632"/>
+              </a:xfrm>
+              <a:prstGeom prst="rect">
+                <a:avLst/>
+              </a:prstGeom>
+              <a:solidFill>
+                <a:srgbClr val="5B7C99"/>
+              </a:solidFill>
+              <a:ln w="28575">
+                <a:noFill/>
+              </a:ln>
+            </p:spPr>
+            <p:style>
+              <a:lnRef idx="2">
+                <a:schemeClr val="accent1">
+                  <a:shade val="15000"/>
+                </a:schemeClr>
+              </a:lnRef>
+              <a:fillRef idx="1">
+                <a:schemeClr val="accent1"/>
+              </a:fillRef>
+              <a:effectRef idx="0">
+                <a:schemeClr val="accent1"/>
+              </a:effectRef>
+              <a:fontRef idx="minor">
+                <a:schemeClr val="lt1"/>
+              </a:fontRef>
+            </p:style>
+            <p:txBody>
+              <a:bodyPr rtlCol="0" anchor="ctr"/>
+              <a:lstStyle/>
+              <a:p>
+                <a:pPr algn="ctr"/>
+                <a:endParaRPr lang="en-IN" dirty="0"/>
+              </a:p>
+            </p:txBody>
+          </p:sp>
+          <p:sp>
+            <p:nvSpPr>
+              <p:cNvPr id="25" name="TextBox 24">
+                <a:extLst>
+                  <a:ext uri="{FF2B5EF4-FFF2-40B4-BE49-F238E27FC236}">
+                    <a16:creationId xmlns:a16="http://schemas.microsoft.com/office/drawing/2014/main" id="{CE9D5559-97F3-7270-591E-98EE20773C9B}"/>
+                  </a:ext>
+                </a:extLst>
+              </p:cNvPr>
+              <p:cNvSpPr txBox="1"/>
+              <p:nvPr/>
+            </p:nvSpPr>
+            <p:spPr>
+              <a:xfrm>
+                <a:off x="3914390" y="3745913"/>
+                <a:ext cx="3028524" cy="686044"/>
+              </a:xfrm>
+              <a:prstGeom prst="rect">
+                <a:avLst/>
+              </a:prstGeom>
+              <a:noFill/>
+            </p:spPr>
+            <p:txBody>
+              <a:bodyPr wrap="square" rtlCol="0">
+                <a:spAutoFit/>
+              </a:bodyPr>
+              <a:lstStyle/>
+              <a:p>
+                <a:pPr algn="ctr"/>
+                <a:r>
+                  <a:rPr lang="en-US" sz="5400" dirty="0" err="1">
+                    <a:solidFill>
+                      <a:srgbClr val="EEF4ED"/>
+                    </a:solidFill>
+                    <a:latin typeface="Rockwell Extra Bold" panose="02060903040505020403" pitchFamily="18" charset="0"/>
+                  </a:rPr>
+                  <a:t>tek</a:t>
+                </a:r>
+                <a:r>
+                  <a:rPr lang="en-US" sz="5400" dirty="0" err="1">
+                    <a:solidFill>
+                      <a:srgbClr val="EEF4ED"/>
+                    </a:solidFill>
+                    <a:latin typeface="Rockwell" panose="02060603020205020403" pitchFamily="18" charset="0"/>
+                  </a:rPr>
+                  <a:t>Medika</a:t>
+                </a:r>
+                <a:endParaRPr lang="en-IN" sz="4800" dirty="0">
+                  <a:solidFill>
+                    <a:srgbClr val="EEF4ED"/>
+                  </a:solidFill>
+                  <a:latin typeface="Rockwell" panose="02060603020205020403" pitchFamily="18" charset="0"/>
+                </a:endParaRPr>
+              </a:p>
+            </p:txBody>
+          </p:sp>
+        </p:grpSp>
+      </p:grpSp>
+      <p:grpSp>
+        <p:nvGrpSpPr>
+          <p:cNvPr id="26" name="Group 25">
+            <a:extLst>
+              <a:ext uri="{FF2B5EF4-FFF2-40B4-BE49-F238E27FC236}">
+                <a16:creationId xmlns:a16="http://schemas.microsoft.com/office/drawing/2014/main" id="{6AF8BED4-4460-7F41-11AB-BA4829D642FE}"/>
+              </a:ext>
+            </a:extLst>
+          </p:cNvPr>
+          <p:cNvGrpSpPr/>
+          <p:nvPr/>
+        </p:nvGrpSpPr>
+        <p:grpSpPr>
+          <a:xfrm>
+            <a:off x="2001588" y="4801552"/>
+            <a:ext cx="8188824" cy="1477301"/>
+            <a:chOff x="406536" y="3152015"/>
+            <a:chExt cx="8188824" cy="1477301"/>
+          </a:xfrm>
+        </p:grpSpPr>
+        <p:sp>
+          <p:nvSpPr>
+            <p:cNvPr id="27" name="Rectangle 26">
+              <a:extLst>
+                <a:ext uri="{FF2B5EF4-FFF2-40B4-BE49-F238E27FC236}">
+                  <a16:creationId xmlns:a16="http://schemas.microsoft.com/office/drawing/2014/main" id="{69FBAFD5-7FDA-6D8D-B059-A0C733290948}"/>
+                </a:ext>
+              </a:extLst>
+            </p:cNvPr>
+            <p:cNvSpPr>
+              <a:spLocks noChangeAspect="1"/>
+            </p:cNvSpPr>
+            <p:nvPr/>
+          </p:nvSpPr>
+          <p:spPr>
+            <a:xfrm>
+              <a:off x="406536" y="3152015"/>
+              <a:ext cx="2540895" cy="1477301"/>
+            </a:xfrm>
+            <a:prstGeom prst="rect">
+              <a:avLst/>
+            </a:prstGeom>
+            <a:solidFill>
+              <a:srgbClr val="2C94BC"/>
+            </a:solidFill>
+            <a:ln w="28575">
+              <a:noFill/>
+            </a:ln>
+          </p:spPr>
+          <p:style>
+            <a:lnRef idx="2">
+              <a:schemeClr val="accent1">
+                <a:shade val="15000"/>
+              </a:schemeClr>
+            </a:lnRef>
+            <a:fillRef idx="1">
+              <a:schemeClr val="accent1"/>
+            </a:fillRef>
+            <a:effectRef idx="0">
+              <a:schemeClr val="accent1"/>
+            </a:effectRef>
+            <a:fontRef idx="minor">
+              <a:schemeClr val="lt1"/>
+            </a:fontRef>
+          </p:style>
+          <p:txBody>
+            <a:bodyPr rtlCol="0" anchor="ctr"/>
+            <a:lstStyle/>
+            <a:p>
+              <a:pPr algn="ctr"/>
+              <a:r>
+                <a:rPr lang="en-US" sz="3200" b="1" dirty="0">
+                  <a:solidFill>
+                    <a:srgbClr val="EEF4ED"/>
+                  </a:solidFill>
+                </a:rPr>
+                <a:t>INSPIRE-100</a:t>
+              </a:r>
+            </a:p>
+            <a:p>
+              <a:pPr algn="ctr"/>
+              <a:r>
+                <a:rPr lang="en-US" sz="3600" i="1" dirty="0">
+                  <a:solidFill>
+                    <a:srgbClr val="EEF4ED"/>
+                  </a:solidFill>
+                </a:rPr>
+                <a:t>Recorder</a:t>
+              </a:r>
+              <a:endParaRPr lang="en-IN" sz="3200" i="1" dirty="0">
+                <a:solidFill>
+                  <a:srgbClr val="EEF4ED"/>
+                </a:solidFill>
+              </a:endParaRPr>
+            </a:p>
+          </p:txBody>
+        </p:sp>
+        <p:grpSp>
+          <p:nvGrpSpPr>
+            <p:cNvPr id="28" name="Group 27">
+              <a:extLst>
+                <a:ext uri="{FF2B5EF4-FFF2-40B4-BE49-F238E27FC236}">
+                  <a16:creationId xmlns:a16="http://schemas.microsoft.com/office/drawing/2014/main" id="{289F7779-1594-660B-A624-66EE0567FFD5}"/>
+                </a:ext>
+              </a:extLst>
+            </p:cNvPr>
+            <p:cNvGrpSpPr>
+              <a:grpSpLocks noChangeAspect="1"/>
+            </p:cNvGrpSpPr>
+            <p:nvPr/>
+          </p:nvGrpSpPr>
+          <p:grpSpPr>
+            <a:xfrm>
+              <a:off x="2947431" y="3152015"/>
+              <a:ext cx="5647929" cy="1473440"/>
+              <a:chOff x="2819611" y="3567393"/>
+              <a:chExt cx="4196470" cy="1094781"/>
+            </a:xfrm>
+          </p:grpSpPr>
+          <p:pic>
+            <p:nvPicPr>
+              <p:cNvPr id="29" name="Picture 28">
+                <a:extLst>
+                  <a:ext uri="{FF2B5EF4-FFF2-40B4-BE49-F238E27FC236}">
+                    <a16:creationId xmlns:a16="http://schemas.microsoft.com/office/drawing/2014/main" id="{8515BFC5-E5CE-8673-D8EE-AB384C37C56A}"/>
+                  </a:ext>
+                </a:extLst>
+              </p:cNvPr>
+              <p:cNvPicPr>
+                <a:picLocks noChangeAspect="1"/>
+              </p:cNvPicPr>
+              <p:nvPr/>
+            </p:nvPicPr>
+            <p:blipFill>
+              <a:blip r:embed="rId2"/>
+              <a:stretch>
+                <a:fillRect/>
+              </a:stretch>
+            </p:blipFill>
+            <p:spPr>
+              <a:xfrm>
+                <a:off x="2819611" y="3567393"/>
+                <a:ext cx="1094780" cy="1094781"/>
+              </a:xfrm>
+              <a:prstGeom prst="rect">
+                <a:avLst/>
+              </a:prstGeom>
+            </p:spPr>
+          </p:pic>
+          <p:sp>
+            <p:nvSpPr>
+              <p:cNvPr id="30" name="Rectangle 29">
+                <a:extLst>
+                  <a:ext uri="{FF2B5EF4-FFF2-40B4-BE49-F238E27FC236}">
+                    <a16:creationId xmlns:a16="http://schemas.microsoft.com/office/drawing/2014/main" id="{B36C6AB1-ACFA-2840-8E9C-7767762D47E0}"/>
+                  </a:ext>
+                </a:extLst>
+              </p:cNvPr>
+              <p:cNvSpPr>
+                <a:spLocks noChangeAspect="1"/>
+              </p:cNvSpPr>
+              <p:nvPr/>
+            </p:nvSpPr>
+            <p:spPr>
+              <a:xfrm>
+                <a:off x="3914390" y="3567542"/>
+                <a:ext cx="3101691" cy="1094632"/>
+              </a:xfrm>
+              <a:prstGeom prst="rect">
+                <a:avLst/>
+              </a:prstGeom>
+              <a:solidFill>
+                <a:srgbClr val="5B7C99"/>
+              </a:solidFill>
+              <a:ln w="28575">
+                <a:noFill/>
+              </a:ln>
+            </p:spPr>
+            <p:style>
+              <a:lnRef idx="2">
+                <a:schemeClr val="accent1">
+                  <a:shade val="15000"/>
+                </a:schemeClr>
+              </a:lnRef>
+              <a:fillRef idx="1">
+                <a:schemeClr val="accent1"/>
+              </a:fillRef>
+              <a:effectRef idx="0">
+                <a:schemeClr val="accent1"/>
+              </a:effectRef>
+              <a:fontRef idx="minor">
+                <a:schemeClr val="lt1"/>
+              </a:fontRef>
+            </p:style>
+            <p:txBody>
+              <a:bodyPr rtlCol="0" anchor="ctr"/>
+              <a:lstStyle/>
+              <a:p>
+                <a:pPr algn="ctr"/>
+                <a:endParaRPr lang="en-IN" dirty="0"/>
+              </a:p>
+            </p:txBody>
+          </p:sp>
+          <p:sp>
+            <p:nvSpPr>
+              <p:cNvPr id="31" name="TextBox 30">
+                <a:extLst>
+                  <a:ext uri="{FF2B5EF4-FFF2-40B4-BE49-F238E27FC236}">
+                    <a16:creationId xmlns:a16="http://schemas.microsoft.com/office/drawing/2014/main" id="{3DC499CC-3B59-C1E4-D541-C02D9B8C2E9B}"/>
+                  </a:ext>
+                </a:extLst>
+              </p:cNvPr>
+              <p:cNvSpPr txBox="1"/>
+              <p:nvPr/>
+            </p:nvSpPr>
+            <p:spPr>
+              <a:xfrm>
+                <a:off x="3914390" y="3745913"/>
+                <a:ext cx="3028524" cy="686044"/>
+              </a:xfrm>
+              <a:prstGeom prst="rect">
+                <a:avLst/>
+              </a:prstGeom>
+              <a:noFill/>
+            </p:spPr>
+            <p:txBody>
+              <a:bodyPr wrap="square" rtlCol="0">
+                <a:spAutoFit/>
+              </a:bodyPr>
+              <a:lstStyle/>
+              <a:p>
+                <a:pPr algn="ctr"/>
+                <a:r>
+                  <a:rPr lang="en-US" sz="5400" dirty="0" err="1">
+                    <a:solidFill>
+                      <a:srgbClr val="EEF4ED"/>
+                    </a:solidFill>
+                    <a:latin typeface="Rockwell Extra Bold" panose="02060903040505020403" pitchFamily="18" charset="0"/>
+                  </a:rPr>
+                  <a:t>tek</a:t>
+                </a:r>
+                <a:r>
+                  <a:rPr lang="en-US" sz="5400" dirty="0" err="1">
+                    <a:solidFill>
+                      <a:srgbClr val="EEF4ED"/>
+                    </a:solidFill>
+                    <a:latin typeface="Rockwell" panose="02060603020205020403" pitchFamily="18" charset="0"/>
+                  </a:rPr>
+                  <a:t>Medika</a:t>
+                </a:r>
+                <a:endParaRPr lang="en-IN" sz="4800" dirty="0">
+                  <a:solidFill>
+                    <a:srgbClr val="EEF4ED"/>
+                  </a:solidFill>
+                  <a:latin typeface="Rockwell" panose="02060603020205020403" pitchFamily="18" charset="0"/>
+                </a:endParaRPr>
+              </a:p>
+            </p:txBody>
+          </p:sp>
+        </p:grpSp>
+      </p:grpSp>
+    </p:spTree>
+    <p:extLst>
+      <p:ext uri="{BB962C8B-B14F-4D97-AF65-F5344CB8AC3E}">
+        <p14:creationId xmlns:p14="http://schemas.microsoft.com/office/powerpoint/2010/main" val="2090250459"/>
+      </p:ext>
+    </p:extLst>
+  </p:cSld>
+  <p:clrMapOvr>
+    <a:masterClrMapping/>
+  </p:clrMapOvr>
+</p:sld>
+</file>
+
+<file path=ppt/slides/slide4.xml><?xml version="1.0" encoding="utf-8"?>
+<p:sld xmlns:a="http://schemas.openxmlformats.org/drawingml/2006/main" xmlns:r="http://schemas.openxmlformats.org/officeDocument/2006/relationships" xmlns:p="http://schemas.openxmlformats.org/presentationml/2006/main">
+  <p:cSld>
+    <p:spTree>
+      <p:nvGrpSpPr>
+        <p:cNvPr id="1" name=""/>
+        <p:cNvGrpSpPr/>
+        <p:nvPr/>
+      </p:nvGrpSpPr>
+      <p:grpSpPr>
+        <a:xfrm>
+          <a:off x="0" y="0"/>
+          <a:ext cx="0" cy="0"/>
+          <a:chOff x="0" y="0"/>
+          <a:chExt cx="0" cy="0"/>
+        </a:xfrm>
+      </p:grpSpPr>
+      <p:grpSp>
+        <p:nvGrpSpPr>
           <p:cNvPr id="4" name="Group 3">
             <a:extLst>
               <a:ext uri="{FF2B5EF4-FFF2-40B4-BE49-F238E27FC236}">
@@ -4042,7 +6288,7 @@
     </p:spTree>
     <p:extLst>
       <p:ext uri="{BB962C8B-B14F-4D97-AF65-F5344CB8AC3E}">
-        <p14:creationId xmlns:p14="http://schemas.microsoft.com/office/powerpoint/2010/main" val="1887048"/>
+        <p14:creationId xmlns:p14="http://schemas.microsoft.com/office/powerpoint/2010/main" val="3815280021"/>
       </p:ext>
     </p:extLst>
   </p:cSld>
@@ -4052,7 +6298,7 @@
 </p:sld>
 </file>
 
-<file path=ppt/slides/slide2.xml><?xml version="1.0" encoding="utf-8"?>
+<file path=ppt/slides/slide5.xml><?xml version="1.0" encoding="utf-8"?>
 <p:sld xmlns:a="http://schemas.openxmlformats.org/drawingml/2006/main" xmlns:r="http://schemas.openxmlformats.org/officeDocument/2006/relationships" xmlns:p="http://schemas.openxmlformats.org/presentationml/2006/main">
   <p:cSld>
     <p:spTree>
@@ -4567,7 +6813,7 @@
 </p:sld>
 </file>
 
-<file path=ppt/slides/slide3.xml><?xml version="1.0" encoding="utf-8"?>
+<file path=ppt/slides/slide6.xml><?xml version="1.0" encoding="utf-8"?>
 <p:sld xmlns:a="http://schemas.openxmlformats.org/drawingml/2006/main" xmlns:r="http://schemas.openxmlformats.org/officeDocument/2006/relationships" xmlns:p="http://schemas.openxmlformats.org/presentationml/2006/main">
   <p:cSld>
     <p:spTree>
@@ -5320,7 +7566,7 @@
 </p:sld>
 </file>
 
-<file path=ppt/slides/slide4.xml><?xml version="1.0" encoding="utf-8"?>
+<file path=ppt/slides/slide7.xml><?xml version="1.0" encoding="utf-8"?>
 <p:sld xmlns:a="http://schemas.openxmlformats.org/drawingml/2006/main" xmlns:r="http://schemas.openxmlformats.org/officeDocument/2006/relationships" xmlns:p="http://schemas.openxmlformats.org/presentationml/2006/main">
   <p:cSld>
     <p:spTree>
@@ -6037,7 +8283,7 @@
 </p:sld>
 </file>
 
-<file path=ppt/slides/slide5.xml><?xml version="1.0" encoding="utf-8"?>
+<file path=ppt/slides/slide8.xml><?xml version="1.0" encoding="utf-8"?>
 <p:sld xmlns:a="http://schemas.openxmlformats.org/drawingml/2006/main" xmlns:r="http://schemas.openxmlformats.org/officeDocument/2006/relationships" xmlns:p="http://schemas.openxmlformats.org/presentationml/2006/main">
   <p:cSld>
     <p:spTree>
@@ -6969,7 +9215,7 @@
 </p:sld>
 </file>
 
-<file path=ppt/slides/slide6.xml><?xml version="1.0" encoding="utf-8"?>
+<file path=ppt/slides/slide9.xml><?xml version="1.0" encoding="utf-8"?>
 <p:sld xmlns:a="http://schemas.openxmlformats.org/drawingml/2006/main" xmlns:r="http://schemas.openxmlformats.org/officeDocument/2006/relationships" xmlns:p="http://schemas.openxmlformats.org/presentationml/2006/main">
   <p:cSld>
     <p:spTree>

</xml_diff>